<commit_message>
SCR 01 Dauerlauf mit Sprints
für die Promotion überarbeitet
</commit_message>
<xml_diff>
--- a/training-cards/music moves/Scrum (SCR)/ger/apprentice/ger_SCR_01_Dauerlauf_mit_Sprints_MM_A.pptx
+++ b/training-cards/music moves/Scrum (SCR)/ger/apprentice/ger_SCR_01_Dauerlauf_mit_Sprints_MM_A.pptx
@@ -162,10 +162,9 @@
           <a:lstStyle/>
           <a:p>
             <a:r>
-              <a:rPr lang="de-DE" smtClean="0"/>
+              <a:rPr lang="de-DE"/>
               <a:t>Mastertitelformat bearbeiten</a:t>
             </a:r>
-            <a:endParaRPr lang="de-DE"/>
           </a:p>
         </p:txBody>
       </p:sp>
@@ -281,10 +280,9 @@
           </a:lstStyle>
           <a:p>
             <a:r>
-              <a:rPr lang="de-DE" smtClean="0"/>
+              <a:rPr lang="de-DE"/>
               <a:t>Master-Untertitelformat bearbeiten</a:t>
             </a:r>
-            <a:endParaRPr lang="de-DE"/>
           </a:p>
         </p:txBody>
       </p:sp>
@@ -305,7 +303,7 @@
           <a:p>
             <a:fld id="{2771F302-5F8D-7040-824F-9A5E9428D1CE}" type="datetimeFigureOut">
               <a:rPr lang="de-DE" smtClean="0"/>
-              <a:t>22.02.16</a:t>
+              <a:t>07.09.18</a:t>
             </a:fld>
             <a:endParaRPr lang="de-DE"/>
           </a:p>
@@ -399,10 +397,9 @@
           <a:lstStyle/>
           <a:p>
             <a:r>
-              <a:rPr lang="de-DE" smtClean="0"/>
+              <a:rPr lang="de-DE"/>
               <a:t>Mastertitelformat bearbeiten</a:t>
             </a:r>
-            <a:endParaRPr lang="de-DE"/>
           </a:p>
         </p:txBody>
       </p:sp>
@@ -423,38 +420,37 @@
           <a:p>
             <a:pPr lvl="0"/>
             <a:r>
-              <a:rPr lang="de-DE" smtClean="0"/>
+              <a:rPr lang="de-DE"/>
               <a:t>Mastertextformat bearbeiten</a:t>
             </a:r>
           </a:p>
           <a:p>
             <a:pPr lvl="1"/>
             <a:r>
-              <a:rPr lang="de-DE" smtClean="0"/>
+              <a:rPr lang="de-DE"/>
               <a:t>Zweite Ebene</a:t>
             </a:r>
           </a:p>
           <a:p>
             <a:pPr lvl="2"/>
             <a:r>
-              <a:rPr lang="de-DE" smtClean="0"/>
+              <a:rPr lang="de-DE"/>
               <a:t>Dritte Ebene</a:t>
             </a:r>
           </a:p>
           <a:p>
             <a:pPr lvl="3"/>
             <a:r>
-              <a:rPr lang="de-DE" smtClean="0"/>
+              <a:rPr lang="de-DE"/>
               <a:t>Vierte Ebene</a:t>
             </a:r>
           </a:p>
           <a:p>
             <a:pPr lvl="4"/>
             <a:r>
-              <a:rPr lang="de-DE" smtClean="0"/>
+              <a:rPr lang="de-DE"/>
               <a:t>Fünfte Ebene</a:t>
             </a:r>
-            <a:endParaRPr lang="de-DE"/>
           </a:p>
         </p:txBody>
       </p:sp>
@@ -475,7 +471,7 @@
           <a:p>
             <a:fld id="{2771F302-5F8D-7040-824F-9A5E9428D1CE}" type="datetimeFigureOut">
               <a:rPr lang="de-DE" smtClean="0"/>
-              <a:t>22.02.16</a:t>
+              <a:t>07.09.18</a:t>
             </a:fld>
             <a:endParaRPr lang="de-DE"/>
           </a:p>
@@ -574,10 +570,9 @@
           <a:lstStyle/>
           <a:p>
             <a:r>
-              <a:rPr lang="de-DE" smtClean="0"/>
+              <a:rPr lang="de-DE"/>
               <a:t>Mastertitelformat bearbeiten</a:t>
             </a:r>
-            <a:endParaRPr lang="de-DE"/>
           </a:p>
         </p:txBody>
       </p:sp>
@@ -603,38 +598,37 @@
           <a:p>
             <a:pPr lvl="0"/>
             <a:r>
-              <a:rPr lang="de-DE" smtClean="0"/>
+              <a:rPr lang="de-DE"/>
               <a:t>Mastertextformat bearbeiten</a:t>
             </a:r>
           </a:p>
           <a:p>
             <a:pPr lvl="1"/>
             <a:r>
-              <a:rPr lang="de-DE" smtClean="0"/>
+              <a:rPr lang="de-DE"/>
               <a:t>Zweite Ebene</a:t>
             </a:r>
           </a:p>
           <a:p>
             <a:pPr lvl="2"/>
             <a:r>
-              <a:rPr lang="de-DE" smtClean="0"/>
+              <a:rPr lang="de-DE"/>
               <a:t>Dritte Ebene</a:t>
             </a:r>
           </a:p>
           <a:p>
             <a:pPr lvl="3"/>
             <a:r>
-              <a:rPr lang="de-DE" smtClean="0"/>
+              <a:rPr lang="de-DE"/>
               <a:t>Vierte Ebene</a:t>
             </a:r>
           </a:p>
           <a:p>
             <a:pPr lvl="4"/>
             <a:r>
-              <a:rPr lang="de-DE" smtClean="0"/>
+              <a:rPr lang="de-DE"/>
               <a:t>Fünfte Ebene</a:t>
             </a:r>
-            <a:endParaRPr lang="de-DE"/>
           </a:p>
         </p:txBody>
       </p:sp>
@@ -655,7 +649,7 @@
           <a:p>
             <a:fld id="{2771F302-5F8D-7040-824F-9A5E9428D1CE}" type="datetimeFigureOut">
               <a:rPr lang="de-DE" smtClean="0"/>
-              <a:t>22.02.16</a:t>
+              <a:t>07.09.18</a:t>
             </a:fld>
             <a:endParaRPr lang="de-DE"/>
           </a:p>
@@ -749,10 +743,9 @@
           <a:lstStyle/>
           <a:p>
             <a:r>
-              <a:rPr lang="de-DE" smtClean="0"/>
+              <a:rPr lang="de-DE"/>
               <a:t>Mastertitelformat bearbeiten</a:t>
             </a:r>
-            <a:endParaRPr lang="de-DE"/>
           </a:p>
         </p:txBody>
       </p:sp>
@@ -773,38 +766,37 @@
           <a:p>
             <a:pPr lvl="0"/>
             <a:r>
-              <a:rPr lang="de-DE" smtClean="0"/>
+              <a:rPr lang="de-DE"/>
               <a:t>Mastertextformat bearbeiten</a:t>
             </a:r>
           </a:p>
           <a:p>
             <a:pPr lvl="1"/>
             <a:r>
-              <a:rPr lang="de-DE" smtClean="0"/>
+              <a:rPr lang="de-DE"/>
               <a:t>Zweite Ebene</a:t>
             </a:r>
           </a:p>
           <a:p>
             <a:pPr lvl="2"/>
             <a:r>
-              <a:rPr lang="de-DE" smtClean="0"/>
+              <a:rPr lang="de-DE"/>
               <a:t>Dritte Ebene</a:t>
             </a:r>
           </a:p>
           <a:p>
             <a:pPr lvl="3"/>
             <a:r>
-              <a:rPr lang="de-DE" smtClean="0"/>
+              <a:rPr lang="de-DE"/>
               <a:t>Vierte Ebene</a:t>
             </a:r>
           </a:p>
           <a:p>
             <a:pPr lvl="4"/>
             <a:r>
-              <a:rPr lang="de-DE" smtClean="0"/>
+              <a:rPr lang="de-DE"/>
               <a:t>Fünfte Ebene</a:t>
             </a:r>
-            <a:endParaRPr lang="de-DE"/>
           </a:p>
         </p:txBody>
       </p:sp>
@@ -825,7 +817,7 @@
           <a:p>
             <a:fld id="{2771F302-5F8D-7040-824F-9A5E9428D1CE}" type="datetimeFigureOut">
               <a:rPr lang="de-DE" smtClean="0"/>
-              <a:t>22.02.16</a:t>
+              <a:t>07.09.18</a:t>
             </a:fld>
             <a:endParaRPr lang="de-DE"/>
           </a:p>
@@ -928,10 +920,9 @@
           </a:lstStyle>
           <a:p>
             <a:r>
-              <a:rPr lang="de-DE" smtClean="0"/>
+              <a:rPr lang="de-DE"/>
               <a:t>Mastertitelformat bearbeiten</a:t>
             </a:r>
-            <a:endParaRPr lang="de-DE"/>
           </a:p>
         </p:txBody>
       </p:sp>
@@ -1048,7 +1039,7 @@
           <a:p>
             <a:pPr lvl="0"/>
             <a:r>
-              <a:rPr lang="de-DE" smtClean="0"/>
+              <a:rPr lang="de-DE"/>
               <a:t>Mastertextformat bearbeiten</a:t>
             </a:r>
           </a:p>
@@ -1071,7 +1062,7 @@
           <a:p>
             <a:fld id="{2771F302-5F8D-7040-824F-9A5E9428D1CE}" type="datetimeFigureOut">
               <a:rPr lang="de-DE" smtClean="0"/>
-              <a:t>22.02.16</a:t>
+              <a:t>07.09.18</a:t>
             </a:fld>
             <a:endParaRPr lang="de-DE"/>
           </a:p>
@@ -1165,10 +1156,9 @@
           <a:lstStyle/>
           <a:p>
             <a:r>
-              <a:rPr lang="de-DE" smtClean="0"/>
+              <a:rPr lang="de-DE"/>
               <a:t>Mastertitelformat bearbeiten</a:t>
             </a:r>
-            <a:endParaRPr lang="de-DE"/>
           </a:p>
         </p:txBody>
       </p:sp>
@@ -1222,38 +1212,37 @@
           <a:p>
             <a:pPr lvl="0"/>
             <a:r>
-              <a:rPr lang="de-DE" smtClean="0"/>
+              <a:rPr lang="de-DE"/>
               <a:t>Mastertextformat bearbeiten</a:t>
             </a:r>
           </a:p>
           <a:p>
             <a:pPr lvl="1"/>
             <a:r>
-              <a:rPr lang="de-DE" smtClean="0"/>
+              <a:rPr lang="de-DE"/>
               <a:t>Zweite Ebene</a:t>
             </a:r>
           </a:p>
           <a:p>
             <a:pPr lvl="2"/>
             <a:r>
-              <a:rPr lang="de-DE" smtClean="0"/>
+              <a:rPr lang="de-DE"/>
               <a:t>Dritte Ebene</a:t>
             </a:r>
           </a:p>
           <a:p>
             <a:pPr lvl="3"/>
             <a:r>
-              <a:rPr lang="de-DE" smtClean="0"/>
+              <a:rPr lang="de-DE"/>
               <a:t>Vierte Ebene</a:t>
             </a:r>
           </a:p>
           <a:p>
             <a:pPr lvl="4"/>
             <a:r>
-              <a:rPr lang="de-DE" smtClean="0"/>
+              <a:rPr lang="de-DE"/>
               <a:t>Fünfte Ebene</a:t>
             </a:r>
-            <a:endParaRPr lang="de-DE"/>
           </a:p>
         </p:txBody>
       </p:sp>
@@ -1307,38 +1296,37 @@
           <a:p>
             <a:pPr lvl="0"/>
             <a:r>
-              <a:rPr lang="de-DE" smtClean="0"/>
+              <a:rPr lang="de-DE"/>
               <a:t>Mastertextformat bearbeiten</a:t>
             </a:r>
           </a:p>
           <a:p>
             <a:pPr lvl="1"/>
             <a:r>
-              <a:rPr lang="de-DE" smtClean="0"/>
+              <a:rPr lang="de-DE"/>
               <a:t>Zweite Ebene</a:t>
             </a:r>
           </a:p>
           <a:p>
             <a:pPr lvl="2"/>
             <a:r>
-              <a:rPr lang="de-DE" smtClean="0"/>
+              <a:rPr lang="de-DE"/>
               <a:t>Dritte Ebene</a:t>
             </a:r>
           </a:p>
           <a:p>
             <a:pPr lvl="3"/>
             <a:r>
-              <a:rPr lang="de-DE" smtClean="0"/>
+              <a:rPr lang="de-DE"/>
               <a:t>Vierte Ebene</a:t>
             </a:r>
           </a:p>
           <a:p>
             <a:pPr lvl="4"/>
             <a:r>
-              <a:rPr lang="de-DE" smtClean="0"/>
+              <a:rPr lang="de-DE"/>
               <a:t>Fünfte Ebene</a:t>
             </a:r>
-            <a:endParaRPr lang="de-DE"/>
           </a:p>
         </p:txBody>
       </p:sp>
@@ -1359,7 +1347,7 @@
           <a:p>
             <a:fld id="{2771F302-5F8D-7040-824F-9A5E9428D1CE}" type="datetimeFigureOut">
               <a:rPr lang="de-DE" smtClean="0"/>
-              <a:t>22.02.16</a:t>
+              <a:t>07.09.18</a:t>
             </a:fld>
             <a:endParaRPr lang="de-DE"/>
           </a:p>
@@ -1457,10 +1445,9 @@
           </a:lstStyle>
           <a:p>
             <a:r>
-              <a:rPr lang="de-DE" smtClean="0"/>
+              <a:rPr lang="de-DE"/>
               <a:t>Mastertitelformat bearbeiten</a:t>
             </a:r>
-            <a:endParaRPr lang="de-DE"/>
           </a:p>
         </p:txBody>
       </p:sp>
@@ -1523,7 +1510,7 @@
           <a:p>
             <a:pPr lvl="0"/>
             <a:r>
-              <a:rPr lang="de-DE" smtClean="0"/>
+              <a:rPr lang="de-DE"/>
               <a:t>Mastertextformat bearbeiten</a:t>
             </a:r>
           </a:p>
@@ -1579,38 +1566,37 @@
           <a:p>
             <a:pPr lvl="0"/>
             <a:r>
-              <a:rPr lang="de-DE" smtClean="0"/>
+              <a:rPr lang="de-DE"/>
               <a:t>Mastertextformat bearbeiten</a:t>
             </a:r>
           </a:p>
           <a:p>
             <a:pPr lvl="1"/>
             <a:r>
-              <a:rPr lang="de-DE" smtClean="0"/>
+              <a:rPr lang="de-DE"/>
               <a:t>Zweite Ebene</a:t>
             </a:r>
           </a:p>
           <a:p>
             <a:pPr lvl="2"/>
             <a:r>
-              <a:rPr lang="de-DE" smtClean="0"/>
+              <a:rPr lang="de-DE"/>
               <a:t>Dritte Ebene</a:t>
             </a:r>
           </a:p>
           <a:p>
             <a:pPr lvl="3"/>
             <a:r>
-              <a:rPr lang="de-DE" smtClean="0"/>
+              <a:rPr lang="de-DE"/>
               <a:t>Vierte Ebene</a:t>
             </a:r>
           </a:p>
           <a:p>
             <a:pPr lvl="4"/>
             <a:r>
-              <a:rPr lang="de-DE" smtClean="0"/>
+              <a:rPr lang="de-DE"/>
               <a:t>Fünfte Ebene</a:t>
             </a:r>
-            <a:endParaRPr lang="de-DE"/>
           </a:p>
         </p:txBody>
       </p:sp>
@@ -1673,7 +1659,7 @@
           <a:p>
             <a:pPr lvl="0"/>
             <a:r>
-              <a:rPr lang="de-DE" smtClean="0"/>
+              <a:rPr lang="de-DE"/>
               <a:t>Mastertextformat bearbeiten</a:t>
             </a:r>
           </a:p>
@@ -1729,38 +1715,37 @@
           <a:p>
             <a:pPr lvl="0"/>
             <a:r>
-              <a:rPr lang="de-DE" smtClean="0"/>
+              <a:rPr lang="de-DE"/>
               <a:t>Mastertextformat bearbeiten</a:t>
             </a:r>
           </a:p>
           <a:p>
             <a:pPr lvl="1"/>
             <a:r>
-              <a:rPr lang="de-DE" smtClean="0"/>
+              <a:rPr lang="de-DE"/>
               <a:t>Zweite Ebene</a:t>
             </a:r>
           </a:p>
           <a:p>
             <a:pPr lvl="2"/>
             <a:r>
-              <a:rPr lang="de-DE" smtClean="0"/>
+              <a:rPr lang="de-DE"/>
               <a:t>Dritte Ebene</a:t>
             </a:r>
           </a:p>
           <a:p>
             <a:pPr lvl="3"/>
             <a:r>
-              <a:rPr lang="de-DE" smtClean="0"/>
+              <a:rPr lang="de-DE"/>
               <a:t>Vierte Ebene</a:t>
             </a:r>
           </a:p>
           <a:p>
             <a:pPr lvl="4"/>
             <a:r>
-              <a:rPr lang="de-DE" smtClean="0"/>
+              <a:rPr lang="de-DE"/>
               <a:t>Fünfte Ebene</a:t>
             </a:r>
-            <a:endParaRPr lang="de-DE"/>
           </a:p>
         </p:txBody>
       </p:sp>
@@ -1781,7 +1766,7 @@
           <a:p>
             <a:fld id="{2771F302-5F8D-7040-824F-9A5E9428D1CE}" type="datetimeFigureOut">
               <a:rPr lang="de-DE" smtClean="0"/>
-              <a:t>22.02.16</a:t>
+              <a:t>07.09.18</a:t>
             </a:fld>
             <a:endParaRPr lang="de-DE"/>
           </a:p>
@@ -1875,10 +1860,9 @@
           <a:lstStyle/>
           <a:p>
             <a:r>
-              <a:rPr lang="de-DE" smtClean="0"/>
+              <a:rPr lang="de-DE"/>
               <a:t>Mastertitelformat bearbeiten</a:t>
             </a:r>
-            <a:endParaRPr lang="de-DE"/>
           </a:p>
         </p:txBody>
       </p:sp>
@@ -1899,7 +1883,7 @@
           <a:p>
             <a:fld id="{2771F302-5F8D-7040-824F-9A5E9428D1CE}" type="datetimeFigureOut">
               <a:rPr lang="de-DE" smtClean="0"/>
-              <a:t>22.02.16</a:t>
+              <a:t>07.09.18</a:t>
             </a:fld>
             <a:endParaRPr lang="de-DE"/>
           </a:p>
@@ -1994,7 +1978,7 @@
           <a:p>
             <a:fld id="{2771F302-5F8D-7040-824F-9A5E9428D1CE}" type="datetimeFigureOut">
               <a:rPr lang="de-DE" smtClean="0"/>
-              <a:t>22.02.16</a:t>
+              <a:t>07.09.18</a:t>
             </a:fld>
             <a:endParaRPr lang="de-DE"/>
           </a:p>
@@ -2097,10 +2081,9 @@
           </a:lstStyle>
           <a:p>
             <a:r>
-              <a:rPr lang="de-DE" smtClean="0"/>
+              <a:rPr lang="de-DE"/>
               <a:t>Mastertitelformat bearbeiten</a:t>
             </a:r>
-            <a:endParaRPr lang="de-DE"/>
           </a:p>
         </p:txBody>
       </p:sp>
@@ -2154,38 +2137,37 @@
           <a:p>
             <a:pPr lvl="0"/>
             <a:r>
-              <a:rPr lang="de-DE" smtClean="0"/>
+              <a:rPr lang="de-DE"/>
               <a:t>Mastertextformat bearbeiten</a:t>
             </a:r>
           </a:p>
           <a:p>
             <a:pPr lvl="1"/>
             <a:r>
-              <a:rPr lang="de-DE" smtClean="0"/>
+              <a:rPr lang="de-DE"/>
               <a:t>Zweite Ebene</a:t>
             </a:r>
           </a:p>
           <a:p>
             <a:pPr lvl="2"/>
             <a:r>
-              <a:rPr lang="de-DE" smtClean="0"/>
+              <a:rPr lang="de-DE"/>
               <a:t>Dritte Ebene</a:t>
             </a:r>
           </a:p>
           <a:p>
             <a:pPr lvl="3"/>
             <a:r>
-              <a:rPr lang="de-DE" smtClean="0"/>
+              <a:rPr lang="de-DE"/>
               <a:t>Vierte Ebene</a:t>
             </a:r>
           </a:p>
           <a:p>
             <a:pPr lvl="4"/>
             <a:r>
-              <a:rPr lang="de-DE" smtClean="0"/>
+              <a:rPr lang="de-DE"/>
               <a:t>Fünfte Ebene</a:t>
             </a:r>
-            <a:endParaRPr lang="de-DE"/>
           </a:p>
         </p:txBody>
       </p:sp>
@@ -2248,7 +2230,7 @@
           <a:p>
             <a:pPr lvl="0"/>
             <a:r>
-              <a:rPr lang="de-DE" smtClean="0"/>
+              <a:rPr lang="de-DE"/>
               <a:t>Mastertextformat bearbeiten</a:t>
             </a:r>
           </a:p>
@@ -2271,7 +2253,7 @@
           <a:p>
             <a:fld id="{2771F302-5F8D-7040-824F-9A5E9428D1CE}" type="datetimeFigureOut">
               <a:rPr lang="de-DE" smtClean="0"/>
-              <a:t>22.02.16</a:t>
+              <a:t>07.09.18</a:t>
             </a:fld>
             <a:endParaRPr lang="de-DE"/>
           </a:p>
@@ -2374,10 +2356,9 @@
           </a:lstStyle>
           <a:p>
             <a:r>
-              <a:rPr lang="de-DE" smtClean="0"/>
+              <a:rPr lang="de-DE"/>
               <a:t>Mastertitelformat bearbeiten</a:t>
             </a:r>
-            <a:endParaRPr lang="de-DE"/>
           </a:p>
         </p:txBody>
       </p:sp>
@@ -2501,7 +2482,7 @@
           <a:p>
             <a:pPr lvl="0"/>
             <a:r>
-              <a:rPr lang="de-DE" smtClean="0"/>
+              <a:rPr lang="de-DE"/>
               <a:t>Mastertextformat bearbeiten</a:t>
             </a:r>
           </a:p>
@@ -2524,7 +2505,7 @@
           <a:p>
             <a:fld id="{2771F302-5F8D-7040-824F-9A5E9428D1CE}" type="datetimeFigureOut">
               <a:rPr lang="de-DE" smtClean="0"/>
-              <a:t>22.02.16</a:t>
+              <a:t>07.09.18</a:t>
             </a:fld>
             <a:endParaRPr lang="de-DE"/>
           </a:p>
@@ -2633,10 +2614,9 @@
           <a:lstStyle/>
           <a:p>
             <a:r>
-              <a:rPr lang="de-DE" smtClean="0"/>
+              <a:rPr lang="de-DE"/>
               <a:t>Mastertitelformat bearbeiten</a:t>
             </a:r>
-            <a:endParaRPr lang="de-DE"/>
           </a:p>
         </p:txBody>
       </p:sp>
@@ -2667,38 +2647,37 @@
           <a:p>
             <a:pPr lvl="0"/>
             <a:r>
-              <a:rPr lang="de-DE" smtClean="0"/>
+              <a:rPr lang="de-DE"/>
               <a:t>Mastertextformat bearbeiten</a:t>
             </a:r>
           </a:p>
           <a:p>
             <a:pPr lvl="1"/>
             <a:r>
-              <a:rPr lang="de-DE" smtClean="0"/>
+              <a:rPr lang="de-DE"/>
               <a:t>Zweite Ebene</a:t>
             </a:r>
           </a:p>
           <a:p>
             <a:pPr lvl="2"/>
             <a:r>
-              <a:rPr lang="de-DE" smtClean="0"/>
+              <a:rPr lang="de-DE"/>
               <a:t>Dritte Ebene</a:t>
             </a:r>
           </a:p>
           <a:p>
             <a:pPr lvl="3"/>
             <a:r>
-              <a:rPr lang="de-DE" smtClean="0"/>
+              <a:rPr lang="de-DE"/>
               <a:t>Vierte Ebene</a:t>
             </a:r>
           </a:p>
           <a:p>
             <a:pPr lvl="4"/>
             <a:r>
-              <a:rPr lang="de-DE" smtClean="0"/>
+              <a:rPr lang="de-DE"/>
               <a:t>Fünfte Ebene</a:t>
             </a:r>
-            <a:endParaRPr lang="de-DE"/>
           </a:p>
         </p:txBody>
       </p:sp>
@@ -2737,7 +2716,7 @@
           <a:p>
             <a:fld id="{2771F302-5F8D-7040-824F-9A5E9428D1CE}" type="datetimeFigureOut">
               <a:rPr lang="de-DE" smtClean="0"/>
-              <a:t>22.02.16</a:t>
+              <a:t>07.09.18</a:t>
             </a:fld>
             <a:endParaRPr lang="de-DE"/>
           </a:p>
@@ -3232,7 +3211,7 @@
           <a:lstStyle/>
           <a:p>
             <a:r>
-              <a:rPr lang="de-DE" sz="1050" b="1" dirty="0" smtClean="0">
+              <a:rPr lang="de-DE" sz="1050" b="1" dirty="0">
                 <a:solidFill>
                   <a:schemeClr val="bg1"/>
                 </a:solidFill>
@@ -3242,7 +3221,7 @@
               <a:t>TRAININGSKARTE</a:t>
             </a:r>
             <a:r>
-              <a:rPr lang="de-DE" sz="1050" dirty="0" smtClean="0">
+              <a:rPr lang="de-DE" sz="1050" dirty="0">
                 <a:solidFill>
                   <a:schemeClr val="bg1"/>
                 </a:solidFill>
@@ -3252,7 +3231,7 @@
               <a:t> </a:t>
             </a:r>
             <a:r>
-              <a:rPr lang="de-DE" sz="1050" b="1" dirty="0" smtClean="0">
+              <a:rPr lang="de-DE" sz="1050" b="1" dirty="0">
                 <a:solidFill>
                   <a:schemeClr val="bg1"/>
                 </a:solidFill>
@@ -3261,13 +3240,6 @@
               </a:rPr>
               <a:t>SCR 01</a:t>
             </a:r>
-            <a:endParaRPr lang="de-DE" sz="1050" b="1" dirty="0">
-              <a:solidFill>
-                <a:schemeClr val="bg1"/>
-              </a:solidFill>
-              <a:latin typeface="Avenir Heavy"/>
-              <a:cs typeface="Avenir Heavy"/>
-            </a:endParaRPr>
           </a:p>
         </p:txBody>
       </p:sp>
@@ -3324,7 +3296,7 @@
           <a:lstStyle/>
           <a:p>
             <a:r>
-              <a:rPr lang="de-DE" sz="2400" dirty="0" smtClean="0">
+              <a:rPr lang="de-DE" sz="2400" dirty="0">
                 <a:solidFill>
                   <a:srgbClr val="7E006B"/>
                 </a:solidFill>
@@ -3334,7 +3306,7 @@
               <a:t>DAUERLAUF </a:t>
             </a:r>
             <a:r>
-              <a:rPr lang="de-DE" sz="2300" dirty="0" smtClean="0">
+              <a:rPr lang="de-DE" sz="2300" dirty="0">
                 <a:solidFill>
                   <a:srgbClr val="7E006B"/>
                 </a:solidFill>
@@ -3343,13 +3315,6 @@
               </a:rPr>
               <a:t>MIT SPRINTS</a:t>
             </a:r>
-            <a:endParaRPr lang="de-DE" sz="2300" dirty="0">
-              <a:solidFill>
-                <a:srgbClr val="7E006B"/>
-              </a:solidFill>
-              <a:latin typeface="Avenir Book"/>
-              <a:cs typeface="Avenir Book"/>
-            </a:endParaRPr>
           </a:p>
         </p:txBody>
       </p:sp>
@@ -3362,7 +3327,7 @@
         <p:spPr>
           <a:xfrm>
             <a:off x="865450" y="1584056"/>
-            <a:ext cx="5942053" cy="3308598"/>
+            <a:ext cx="5942053" cy="3924151"/>
           </a:xfrm>
           <a:prstGeom prst="rect">
             <a:avLst/>
@@ -3387,7 +3352,7 @@
               </a:buBlip>
             </a:pPr>
             <a:r>
-              <a:rPr lang="de-DE" sz="1000" dirty="0" smtClean="0">
+              <a:rPr lang="de-DE" sz="1000" dirty="0">
                 <a:solidFill>
                   <a:srgbClr val="747982"/>
                 </a:solidFill>
@@ -3397,7 +3362,7 @@
               <a:t>Ein Sprint ist eine Zeiteinheit </a:t>
             </a:r>
             <a:r>
-              <a:rPr lang="de-DE" sz="1000" dirty="0" smtClean="0">
+              <a:rPr lang="de-DE" sz="1000" dirty="0">
                 <a:solidFill>
                   <a:srgbClr val="616575"/>
                 </a:solidFill>
@@ -3407,7 +3372,7 @@
               <a:t>von</a:t>
             </a:r>
             <a:r>
-              <a:rPr lang="de-DE" sz="1000" dirty="0" smtClean="0">
+              <a:rPr lang="de-DE" sz="1000" dirty="0">
                 <a:solidFill>
                   <a:srgbClr val="747982"/>
                 </a:solidFill>
@@ -3421,7 +3386,7 @@
             <a:pPr lvl="0">
               <a:buSzPct val="170000"/>
             </a:pPr>
-            <a:endParaRPr lang="de-DE" sz="1000" dirty="0" smtClean="0">
+            <a:endParaRPr lang="de-DE" sz="1000" dirty="0">
               <a:solidFill>
                 <a:srgbClr val="747982"/>
               </a:solidFill>
@@ -3437,14 +3402,34 @@
               </a:buBlip>
             </a:pPr>
             <a:r>
-              <a:rPr lang="de-DE" sz="1000" dirty="0" smtClean="0">
+              <a:rPr lang="de-DE" sz="1000" dirty="0">
                 <a:solidFill>
                   <a:srgbClr val="747982"/>
                 </a:solidFill>
                 <a:latin typeface="Avenir Book"/>
                 <a:cs typeface="Avenir Book"/>
               </a:rPr>
-              <a:t>Zum Sprint gehört eine vorherige schriftliche Planung und ein Retrotreffen mit Deiner Lehrkraft oder deinem Team. Der Sprint läuft auf dieses Treffen zu, in dem man seine Ergebnisse zeigt und bespricht wie der Sprint verlaufen ist und was man im nächsten Sprint verbessern kann.</a:t>
+              <a:t>Zum Sprint gehört eine vorherige schriftliche Planung und ein Retrotreffen mit Deiner Lehrkraft oder deinem Team. Dort wird besprochen wie der Sprint verlaufen ist, und was man im nächsten Sprint verbessern kann. Zu beiden Events gibt es eigene Trainingskarten, wenn Du Dich an der Stelle für eine </a:t>
+            </a:r>
+            <a:r>
+              <a:rPr lang="de-DE" sz="1000">
+                <a:solidFill>
+                  <a:srgbClr val="747982"/>
+                </a:solidFill>
+                <a:latin typeface="Avenir Book"/>
+                <a:cs typeface="Avenir Book"/>
+              </a:rPr>
+              <a:t>Vertiefung interessierst: </a:t>
+            </a:r>
+            <a:r>
+              <a:rPr lang="de-DE" sz="1000" dirty="0">
+                <a:solidFill>
+                  <a:srgbClr val="747982"/>
+                </a:solidFill>
+                <a:latin typeface="Avenir Book"/>
+                <a:cs typeface="Avenir Book"/>
+              </a:rPr>
+              <a:t>SCR 05 und SCR 06.</a:t>
             </a:r>
           </a:p>
           <a:p>
@@ -3470,7 +3455,7 @@
               </a:buBlip>
             </a:pPr>
             <a:r>
-              <a:rPr lang="de-DE" sz="1000" dirty="0" smtClean="0">
+              <a:rPr lang="de-DE" sz="1000" dirty="0">
                 <a:solidFill>
                   <a:srgbClr val="747982"/>
                 </a:solidFill>
@@ -3503,14 +3488,14 @@
               </a:buBlip>
             </a:pPr>
             <a:r>
-              <a:rPr lang="de-DE" sz="1000" dirty="0" smtClean="0">
+              <a:rPr lang="de-DE" sz="1000" dirty="0">
                 <a:solidFill>
                   <a:srgbClr val="747982"/>
                 </a:solidFill>
                 <a:latin typeface="Avenir Book"/>
                 <a:cs typeface="Avenir Book"/>
               </a:rPr>
-              <a:t>Sprints lösen sich unmittelbar ab. Wenn ein Sprint beendet ist beginnt sofort der nächste.</a:t>
+              <a:t>Sprints lösen sich unmittelbar ab. Wenn ein Sprint beendet ist, beginnt sofort der nächste.</a:t>
             </a:r>
           </a:p>
           <a:p>
@@ -3536,7 +3521,7 @@
               </a:buBlip>
             </a:pPr>
             <a:r>
-              <a:rPr lang="de-DE" sz="1000" dirty="0" smtClean="0">
+              <a:rPr lang="de-DE" sz="1000" dirty="0">
                 <a:solidFill>
                   <a:srgbClr val="747982"/>
                 </a:solidFill>
@@ -3569,34 +3554,14 @@
               </a:buBlip>
             </a:pPr>
             <a:r>
-              <a:rPr lang="de-DE" sz="1000" dirty="0" smtClean="0">
+              <a:rPr lang="de-DE" sz="1000" dirty="0">
                 <a:solidFill>
                   <a:srgbClr val="747982"/>
                 </a:solidFill>
                 <a:latin typeface="Avenir Book"/>
                 <a:cs typeface="Avenir Book"/>
               </a:rPr>
-              <a:t>Du stellst Dir Aufgaben für Deinen Sprint, die am Ende zu einem vorzeigbaren Ergebnis führen. Größere Aufgaben kannst du in kleinere Einheiten zerlegen. Diese Aufgaben dokumentierst Du vor Beginn des Sprints in Deinem </a:t>
-            </a:r>
-            <a:r>
-              <a:rPr lang="de-DE" sz="1000" dirty="0" err="1" smtClean="0">
-                <a:solidFill>
-                  <a:srgbClr val="747982"/>
-                </a:solidFill>
-                <a:latin typeface="Avenir Book"/>
-                <a:cs typeface="Avenir Book"/>
-              </a:rPr>
-              <a:t>Teamtool</a:t>
-            </a:r>
-            <a:r>
-              <a:rPr lang="de-DE" sz="1000" dirty="0" smtClean="0">
-                <a:solidFill>
-                  <a:srgbClr val="747982"/>
-                </a:solidFill>
-                <a:latin typeface="Avenir Book"/>
-                <a:cs typeface="Avenir Book"/>
-              </a:rPr>
-              <a:t>.</a:t>
+              <a:t>Du stellst Dir Aufgaben für Deinen Sprint, die am Ende zu einem vorzeigbaren Ergebnis führen. Größere Aufgaben kannst du in kleinere Einheiten zerlegen. Diese Aufgaben dokumentierst Du vor Beginn des Sprints.</a:t>
             </a:r>
           </a:p>
           <a:p>
@@ -3622,35 +3587,60 @@
               </a:buBlip>
             </a:pPr>
             <a:r>
-              <a:rPr lang="de-DE" sz="1000" dirty="0" smtClean="0">
+              <a:rPr lang="de-DE" sz="1000" dirty="0">
                 <a:solidFill>
                   <a:srgbClr val="747982"/>
                 </a:solidFill>
                 <a:latin typeface="Avenir Book"/>
                 <a:cs typeface="Avenir Book"/>
               </a:rPr>
-              <a:t>Es kommen während dem Sprint keine neuen Aufgaben hinzu und keine weg. Es geht darum eine Wahrnehmung zu erarbeiten, </a:t>
-            </a:r>
-            <a:r>
-              <a:rPr lang="de-DE" sz="1000" dirty="0" err="1" smtClean="0">
-                <a:solidFill>
-                  <a:srgbClr val="747982"/>
-                </a:solidFill>
-                <a:latin typeface="Avenir Book"/>
-                <a:cs typeface="Avenir Book"/>
-              </a:rPr>
-              <a:t>wieviel</a:t>
-            </a:r>
-            <a:r>
-              <a:rPr lang="de-DE" sz="1000" dirty="0" smtClean="0">
-                <a:solidFill>
-                  <a:srgbClr val="747982"/>
-                </a:solidFill>
-                <a:latin typeface="Avenir Book"/>
-                <a:cs typeface="Avenir Book"/>
-              </a:rPr>
-              <a:t> Du in einem Sprint schaffen kannst und was für Dich sinnvolle vorzeigbare Ziele sind.</a:t>
-            </a:r>
+              <a:t>Es kommen während dem Sprint keine neuen Aufgaben hinzu und keine weg. Es geht darum eine Wahrnehmung zu erarbeiten, wieviel Du in einem Sprint schaffen kannst und was für Dich sinnvolle vorzeigbare Ziele sind.</a:t>
+            </a:r>
+          </a:p>
+          <a:p>
+            <a:pPr marL="271463" lvl="0" indent="-271463">
+              <a:buSzPct val="170000"/>
+              <a:buBlip>
+                <a:blip r:embed="rId3"/>
+              </a:buBlip>
+            </a:pPr>
+            <a:endParaRPr lang="de-DE" sz="1000" dirty="0">
+              <a:solidFill>
+                <a:srgbClr val="747982"/>
+              </a:solidFill>
+              <a:latin typeface="Avenir Book"/>
+              <a:cs typeface="Avenir Book"/>
+            </a:endParaRPr>
+          </a:p>
+          <a:p>
+            <a:pPr marL="271463" lvl="0" indent="-271463">
+              <a:buSzPct val="170000"/>
+              <a:buBlip>
+                <a:blip r:embed="rId3"/>
+              </a:buBlip>
+            </a:pPr>
+            <a:endParaRPr lang="de-DE" sz="1000" dirty="0">
+              <a:solidFill>
+                <a:srgbClr val="747982"/>
+              </a:solidFill>
+              <a:latin typeface="Avenir Book"/>
+              <a:cs typeface="Avenir Book"/>
+            </a:endParaRPr>
+          </a:p>
+          <a:p>
+            <a:pPr marL="271463" lvl="0" indent="-271463">
+              <a:buSzPct val="170000"/>
+              <a:buBlip>
+                <a:blip r:embed="rId3"/>
+              </a:buBlip>
+            </a:pPr>
+            <a:endParaRPr lang="de-DE" sz="1000" dirty="0">
+              <a:solidFill>
+                <a:srgbClr val="747982"/>
+              </a:solidFill>
+              <a:latin typeface="Avenir Book"/>
+              <a:cs typeface="Avenir Book"/>
+            </a:endParaRPr>
           </a:p>
           <a:p>
             <a:pPr marL="271463" lvl="0" indent="-271463">
@@ -3737,7 +3727,7 @@
           <a:lstStyle/>
           <a:p>
             <a:r>
-              <a:rPr lang="de-DE" sz="1000" dirty="0" smtClean="0">
+              <a:rPr lang="de-DE" sz="1000" dirty="0">
                 <a:solidFill>
                   <a:srgbClr val="616575"/>
                 </a:solidFill>
@@ -3746,13 +3736,6 @@
               </a:rPr>
               <a:t>REGINA BRANDHUBER</a:t>
             </a:r>
-            <a:endParaRPr lang="de-DE" sz="1000" dirty="0">
-              <a:solidFill>
-                <a:srgbClr val="616575"/>
-              </a:solidFill>
-              <a:latin typeface="Avenir Book"/>
-              <a:cs typeface="Avenir Book"/>
-            </a:endParaRPr>
           </a:p>
         </p:txBody>
       </p:sp>
@@ -3906,7 +3889,7 @@
           <a:lstStyle/>
           <a:p>
             <a:r>
-              <a:rPr lang="de-DE" sz="1050" b="1" dirty="0" smtClean="0">
+              <a:rPr lang="de-DE" sz="1050" b="1" dirty="0">
                 <a:solidFill>
                   <a:schemeClr val="bg1"/>
                 </a:solidFill>
@@ -3916,7 +3899,7 @@
               <a:t>TRAININGSKARTE</a:t>
             </a:r>
             <a:r>
-              <a:rPr lang="de-DE" sz="1050" dirty="0" smtClean="0">
+              <a:rPr lang="de-DE" sz="1050" dirty="0">
                 <a:solidFill>
                   <a:schemeClr val="bg1"/>
                 </a:solidFill>
@@ -3926,32 +3909,15 @@
               <a:t> </a:t>
             </a:r>
             <a:r>
-              <a:rPr lang="de-DE" sz="1050" b="1" dirty="0" smtClean="0">
+              <a:rPr lang="de-DE" sz="1050" b="1" dirty="0">
                 <a:solidFill>
                   <a:schemeClr val="bg1"/>
                 </a:solidFill>
                 <a:latin typeface="Avenir Heavy"/>
                 <a:cs typeface="Avenir Heavy"/>
               </a:rPr>
-              <a:t>SCR</a:t>
-            </a:r>
-            <a:r>
-              <a:rPr lang="de-DE" sz="1050" b="1" dirty="0" smtClean="0">
-                <a:solidFill>
-                  <a:schemeClr val="bg1"/>
-                </a:solidFill>
-                <a:latin typeface="Avenir Heavy"/>
-                <a:cs typeface="Avenir Heavy"/>
-              </a:rPr>
-              <a:t> 01</a:t>
-            </a:r>
-            <a:endParaRPr lang="de-DE" sz="1050" b="1" dirty="0">
-              <a:solidFill>
-                <a:schemeClr val="bg1"/>
-              </a:solidFill>
-              <a:latin typeface="Avenir Heavy"/>
-              <a:cs typeface="Avenir Heavy"/>
-            </a:endParaRPr>
+              <a:t>SCR 01</a:t>
+            </a:r>
           </a:p>
         </p:txBody>
       </p:sp>
@@ -4008,7 +3974,7 @@
           <a:lstStyle/>
           <a:p>
             <a:r>
-              <a:rPr lang="de-DE" sz="2400" dirty="0" smtClean="0">
+              <a:rPr lang="de-DE" sz="2400" dirty="0">
                 <a:solidFill>
                   <a:srgbClr val="7E006B"/>
                 </a:solidFill>
@@ -4018,7 +3984,7 @@
               <a:t>TR	AININGS</a:t>
             </a:r>
             <a:r>
-              <a:rPr lang="de-DE" sz="2400" dirty="0" smtClean="0">
+              <a:rPr lang="de-DE" sz="2400" dirty="0">
                 <a:solidFill>
                   <a:srgbClr val="7E006B"/>
                 </a:solidFill>
@@ -4046,7 +4012,7 @@
         <p:spPr>
           <a:xfrm>
             <a:off x="865450" y="1584056"/>
-            <a:ext cx="5942053" cy="1477328"/>
+            <a:ext cx="5942053" cy="2323713"/>
           </a:xfrm>
           <a:prstGeom prst="rect">
             <a:avLst/>
@@ -4065,13 +4031,16 @@
           <a:lstStyle/>
           <a:p>
             <a:pPr marL="271463" indent="-271463">
+              <a:lnSpc>
+                <a:spcPct val="150000"/>
+              </a:lnSpc>
               <a:buSzPct val="170000"/>
               <a:buBlip>
                 <a:blip r:embed="rId3"/>
               </a:buBlip>
             </a:pPr>
             <a:r>
-              <a:rPr lang="de-DE" sz="1000" dirty="0" smtClean="0">
+              <a:rPr lang="de-DE" sz="1000" dirty="0">
                 <a:solidFill>
                   <a:srgbClr val="747982"/>
                 </a:solidFill>
@@ -4083,6 +4052,9 @@
           </a:p>
           <a:p>
             <a:pPr marL="271463" indent="-271463">
+              <a:lnSpc>
+                <a:spcPct val="150000"/>
+              </a:lnSpc>
               <a:buSzPct val="170000"/>
               <a:buBlip>
                 <a:blip r:embed="rId3"/>
@@ -4098,13 +4070,16 @@
           </a:p>
           <a:p>
             <a:pPr marL="271463" indent="-271463">
+              <a:lnSpc>
+                <a:spcPct val="150000"/>
+              </a:lnSpc>
               <a:buSzPct val="170000"/>
               <a:buBlip>
                 <a:blip r:embed="rId3"/>
               </a:buBlip>
             </a:pPr>
             <a:r>
-              <a:rPr lang="de-DE" sz="1000" dirty="0" smtClean="0">
+              <a:rPr lang="de-DE" sz="1000" dirty="0">
                 <a:solidFill>
                   <a:srgbClr val="747982"/>
                 </a:solidFill>
@@ -4116,6 +4091,9 @@
           </a:p>
           <a:p>
             <a:pPr marL="271463" indent="-271463">
+              <a:lnSpc>
+                <a:spcPct val="150000"/>
+              </a:lnSpc>
               <a:buSzPct val="170000"/>
               <a:buBlip>
                 <a:blip r:embed="rId3"/>
@@ -4131,20 +4109,23 @@
           </a:p>
           <a:p>
             <a:pPr marL="271463" indent="-271463">
+              <a:lnSpc>
+                <a:spcPct val="150000"/>
+              </a:lnSpc>
               <a:buSzPct val="170000"/>
               <a:buBlip>
                 <a:blip r:embed="rId3"/>
               </a:buBlip>
             </a:pPr>
             <a:r>
-              <a:rPr lang="de-DE" sz="1000" dirty="0" smtClean="0">
+              <a:rPr lang="de-DE" sz="1000" dirty="0">
                 <a:solidFill>
                   <a:srgbClr val="747982"/>
                 </a:solidFill>
                 <a:latin typeface="Avenir Book"/>
                 <a:cs typeface="Avenir Book"/>
               </a:rPr>
-              <a:t>Es ist unabhängig davon, ob alle Aufgaben im Sprint erledigt wurden. Sie rutschen in den nächsten Sprint. Ein Sprint kann als abgeschlossen gelten, wenn noch Aufgaben übrig sind. Wichtig ist, dass das Ergebnis vorzeigbar ist.</a:t>
+              <a:t>Es ist unabhängig davon, ob alle Aufgaben im Sprint erledigt wurden. Sie rutschen nicht automatisch in den nächsten Sprint. Ein Folgesprint wird wieder von vorne und ohne Altlasten geplant. Ein Sprint kann als abgeschlossen gelten, wenn noch Aufgaben übrig sind. Wichtig ist, dass das Ergebnis vorzeigbar ist.</a:t>
             </a:r>
           </a:p>
           <a:p>
@@ -4246,7 +4227,7 @@
           </a:ln>
           <a:extLst>
             <a:ext uri="{C572A759-6A51-4108-AA02-DFA0A04FC94B}">
-              <ma14:wrappingTextBoxFlag xmlns:ma14="http://schemas.microsoft.com/office/mac/drawingml/2011/main" val="1"/>
+              <ma14:wrappingTextBoxFlag xmlns:ma14="http://schemas.microsoft.com/office/mac/drawingml/2011/main" xmlns="" val="1"/>
             </a:ext>
           </a:extLst>
         </p:spPr>
@@ -4352,7 +4333,7 @@
                 <a:latin typeface="Avenir Light"/>
                 <a:cs typeface="Avenir Light"/>
               </a:rPr>
-              <a:t>22.02.16</a:t>
+              <a:t>07.09.18</a:t>
             </a:fld>
             <a:endParaRPr lang="de-DE" sz="600" dirty="0">
               <a:solidFill>

</xml_diff>

<commit_message>
SCR 01 neue Lizenzen eingepflegt
</commit_message>
<xml_diff>
--- a/training-cards/music moves/Scrum (SCR)/ger/apprentice/ger_SCR_01_Dauerlauf_mit_Sprints_MM_A.pptx
+++ b/training-cards/music moves/Scrum (SCR)/ger/apprentice/ger_SCR_01_Dauerlauf_mit_Sprints_MM_A.pptx
@@ -303,7 +303,7 @@
           <a:p>
             <a:fld id="{2771F302-5F8D-7040-824F-9A5E9428D1CE}" type="datetimeFigureOut">
               <a:rPr lang="de-DE" smtClean="0"/>
-              <a:t>28.09.18</a:t>
+              <a:t>23.07.23</a:t>
             </a:fld>
             <a:endParaRPr lang="de-DE"/>
           </a:p>
@@ -471,7 +471,7 @@
           <a:p>
             <a:fld id="{2771F302-5F8D-7040-824F-9A5E9428D1CE}" type="datetimeFigureOut">
               <a:rPr lang="de-DE" smtClean="0"/>
-              <a:t>28.09.18</a:t>
+              <a:t>23.07.23</a:t>
             </a:fld>
             <a:endParaRPr lang="de-DE"/>
           </a:p>
@@ -649,7 +649,7 @@
           <a:p>
             <a:fld id="{2771F302-5F8D-7040-824F-9A5E9428D1CE}" type="datetimeFigureOut">
               <a:rPr lang="de-DE" smtClean="0"/>
-              <a:t>28.09.18</a:t>
+              <a:t>23.07.23</a:t>
             </a:fld>
             <a:endParaRPr lang="de-DE"/>
           </a:p>
@@ -817,7 +817,7 @@
           <a:p>
             <a:fld id="{2771F302-5F8D-7040-824F-9A5E9428D1CE}" type="datetimeFigureOut">
               <a:rPr lang="de-DE" smtClean="0"/>
-              <a:t>28.09.18</a:t>
+              <a:t>23.07.23</a:t>
             </a:fld>
             <a:endParaRPr lang="de-DE"/>
           </a:p>
@@ -1062,7 +1062,7 @@
           <a:p>
             <a:fld id="{2771F302-5F8D-7040-824F-9A5E9428D1CE}" type="datetimeFigureOut">
               <a:rPr lang="de-DE" smtClean="0"/>
-              <a:t>28.09.18</a:t>
+              <a:t>23.07.23</a:t>
             </a:fld>
             <a:endParaRPr lang="de-DE"/>
           </a:p>
@@ -1347,7 +1347,7 @@
           <a:p>
             <a:fld id="{2771F302-5F8D-7040-824F-9A5E9428D1CE}" type="datetimeFigureOut">
               <a:rPr lang="de-DE" smtClean="0"/>
-              <a:t>28.09.18</a:t>
+              <a:t>23.07.23</a:t>
             </a:fld>
             <a:endParaRPr lang="de-DE"/>
           </a:p>
@@ -1766,7 +1766,7 @@
           <a:p>
             <a:fld id="{2771F302-5F8D-7040-824F-9A5E9428D1CE}" type="datetimeFigureOut">
               <a:rPr lang="de-DE" smtClean="0"/>
-              <a:t>28.09.18</a:t>
+              <a:t>23.07.23</a:t>
             </a:fld>
             <a:endParaRPr lang="de-DE"/>
           </a:p>
@@ -1883,7 +1883,7 @@
           <a:p>
             <a:fld id="{2771F302-5F8D-7040-824F-9A5E9428D1CE}" type="datetimeFigureOut">
               <a:rPr lang="de-DE" smtClean="0"/>
-              <a:t>28.09.18</a:t>
+              <a:t>23.07.23</a:t>
             </a:fld>
             <a:endParaRPr lang="de-DE"/>
           </a:p>
@@ -1978,7 +1978,7 @@
           <a:p>
             <a:fld id="{2771F302-5F8D-7040-824F-9A5E9428D1CE}" type="datetimeFigureOut">
               <a:rPr lang="de-DE" smtClean="0"/>
-              <a:t>28.09.18</a:t>
+              <a:t>23.07.23</a:t>
             </a:fld>
             <a:endParaRPr lang="de-DE"/>
           </a:p>
@@ -2253,7 +2253,7 @@
           <a:p>
             <a:fld id="{2771F302-5F8D-7040-824F-9A5E9428D1CE}" type="datetimeFigureOut">
               <a:rPr lang="de-DE" smtClean="0"/>
-              <a:t>28.09.18</a:t>
+              <a:t>23.07.23</a:t>
             </a:fld>
             <a:endParaRPr lang="de-DE"/>
           </a:p>
@@ -2505,7 +2505,7 @@
           <a:p>
             <a:fld id="{2771F302-5F8D-7040-824F-9A5E9428D1CE}" type="datetimeFigureOut">
               <a:rPr lang="de-DE" smtClean="0"/>
-              <a:t>28.09.18</a:t>
+              <a:t>23.07.23</a:t>
             </a:fld>
             <a:endParaRPr lang="de-DE"/>
           </a:p>
@@ -2716,7 +2716,7 @@
           <a:p>
             <a:fld id="{2771F302-5F8D-7040-824F-9A5E9428D1CE}" type="datetimeFigureOut">
               <a:rPr lang="de-DE" smtClean="0"/>
-              <a:t>28.09.18</a:t>
+              <a:t>23.07.23</a:t>
             </a:fld>
             <a:endParaRPr lang="de-DE"/>
           </a:p>
@@ -3379,7 +3379,7 @@
                 <a:latin typeface="Avenir Book"/>
                 <a:cs typeface="Avenir Book"/>
               </a:rPr>
-              <a:t> einer bis zu  vier Wochen. Zu Beginn eines Sprints wird seine Dauer festgelegt und dann nicht mehr verändert.</a:t>
+              <a:t> einer bis zu vier Wochen. Zu Beginn eines Sprints wird seine Dauer festgelegt und dann nicht mehr verändert.</a:t>
             </a:r>
           </a:p>
           <a:p>
@@ -3409,27 +3409,7 @@
                 <a:latin typeface="Avenir Book"/>
                 <a:cs typeface="Avenir Book"/>
               </a:rPr>
-              <a:t>Zum Sprint gehört eine vorherige schriftliche Planung und ein Retrotreffen </a:t>
-            </a:r>
-            <a:r>
-              <a:rPr lang="de-DE" sz="1000">
-                <a:solidFill>
-                  <a:srgbClr val="747982"/>
-                </a:solidFill>
-                <a:latin typeface="Avenir Book"/>
-                <a:cs typeface="Avenir Book"/>
-              </a:rPr>
-              <a:t>mit Deinem </a:t>
-            </a:r>
-            <a:r>
-              <a:rPr lang="de-DE" sz="1000" dirty="0">
-                <a:solidFill>
-                  <a:srgbClr val="747982"/>
-                </a:solidFill>
-                <a:latin typeface="Avenir Book"/>
-                <a:cs typeface="Avenir Book"/>
-              </a:rPr>
-              <a:t>Team. Dort wird besprochen wie der Sprint verlaufen ist, und was man im nächsten Sprint verbessern kann. Zu beiden Events gibt es eigene Trainingskarten, wenn Du Dich an der Stelle für eine Vertiefung interessierst: SCR 05 und SCR 06.</a:t>
+              <a:t>Zum Sprint gehört eine vorherige schriftliche Planung und ein Retrotreffen mit Deinem Team. Dort wird besprochen wie der Sprint verlaufen ist, und was man im nächsten Sprint verbessern kann. Zu beiden Events gibt es eigene Trainingskarten, wenn Du Dich an der Stelle für eine Vertiefung interessierst: SCR 05 und SCR 06.</a:t>
             </a:r>
           </a:p>
           <a:p>
@@ -4210,14 +4190,20 @@
       </p:pic>
       <p:sp>
         <p:nvSpPr>
-          <p:cNvPr id="11" name="Shape 7"/>
+          <p:cNvPr id="3" name="Shape 7">
+            <a:extLst>
+              <a:ext uri="{FF2B5EF4-FFF2-40B4-BE49-F238E27FC236}">
+                <a16:creationId xmlns:a16="http://schemas.microsoft.com/office/drawing/2014/main" id="{A4B2B643-A8F4-BD88-A50E-A36C326FBDCF}"/>
+              </a:ext>
+            </a:extLst>
+          </p:cNvPr>
           <p:cNvSpPr/>
           <p:nvPr/>
         </p:nvSpPr>
         <p:spPr>
           <a:xfrm>
-            <a:off x="1683417" y="4952581"/>
-            <a:ext cx="4196016" cy="276995"/>
+            <a:off x="971550" y="4689585"/>
+            <a:ext cx="4691860" cy="461661"/>
           </a:xfrm>
           <a:prstGeom prst="rect">
             <a:avLst/>
@@ -4232,7 +4218,7 @@
           </a:extLst>
         </p:spPr>
         <p:txBody>
-          <a:bodyPr wrap="none" lIns="45718" tIns="45718" rIns="45718" bIns="45718">
+          <a:bodyPr wrap="square" lIns="45718" tIns="45718" rIns="45718" bIns="45718">
             <a:spAutoFit/>
           </a:bodyPr>
           <a:lstStyle/>
@@ -4241,49 +4227,266 @@
               <a:defRPr sz="1800"/>
             </a:pPr>
             <a:r>
-              <a:rPr sz="600" dirty="0">
-                <a:latin typeface="Avenir Light"/>
+              <a:rPr lang="de-DE" sz="800" b="0" i="0" u="none" strike="noStrike" dirty="0" err="1">
+                <a:solidFill>
+                  <a:schemeClr val="tx1">
+                    <a:lumMod val="65000"/>
+                    <a:lumOff val="35000"/>
+                  </a:schemeClr>
+                </a:solidFill>
+                <a:effectLst/>
+                <a:latin typeface="Avenir Book" panose="02000503020000020003" pitchFamily="2" charset="0"/>
+              </a:rPr>
+              <a:t>music</a:t>
+            </a:r>
+            <a:r>
+              <a:rPr lang="de-DE" sz="800" b="0" i="0" u="none" strike="noStrike" dirty="0">
+                <a:solidFill>
+                  <a:schemeClr val="tx1">
+                    <a:lumMod val="65000"/>
+                    <a:lumOff val="35000"/>
+                  </a:schemeClr>
+                </a:solidFill>
+                <a:effectLst/>
+                <a:latin typeface="Avenir Book" panose="02000503020000020003" pitchFamily="2" charset="0"/>
+              </a:rPr>
+              <a:t> </a:t>
+            </a:r>
+            <a:r>
+              <a:rPr lang="de-DE" sz="800" b="0" i="0" u="none" strike="noStrike" dirty="0" err="1">
+                <a:solidFill>
+                  <a:schemeClr val="tx1">
+                    <a:lumMod val="65000"/>
+                    <a:lumOff val="35000"/>
+                  </a:schemeClr>
+                </a:solidFill>
+                <a:effectLst/>
+                <a:latin typeface="Avenir Book" panose="02000503020000020003" pitchFamily="2" charset="0"/>
+              </a:rPr>
+              <a:t>moves</a:t>
+            </a:r>
+            <a:r>
+              <a:rPr lang="de-DE" sz="800" b="0" i="0" u="none" strike="noStrike" dirty="0">
+                <a:solidFill>
+                  <a:schemeClr val="tx1">
+                    <a:lumMod val="65000"/>
+                    <a:lumOff val="35000"/>
+                  </a:schemeClr>
+                </a:solidFill>
+                <a:effectLst/>
+                <a:latin typeface="Avenir Book" panose="02000503020000020003" pitchFamily="2" charset="0"/>
+              </a:rPr>
+              <a:t>-Trainingskarten von Regina Brandhuber sind lizenziert unter einer Creative Commons </a:t>
+            </a:r>
+          </a:p>
+          <a:p>
+            <a:pPr lvl="0" algn="ctr">
+              <a:defRPr sz="1800"/>
+            </a:pPr>
+            <a:r>
+              <a:rPr lang="de-DE" sz="800" b="0" i="0" u="none" strike="noStrike" dirty="0">
+                <a:solidFill>
+                  <a:schemeClr val="tx1">
+                    <a:lumMod val="65000"/>
+                    <a:lumOff val="35000"/>
+                  </a:schemeClr>
+                </a:solidFill>
+                <a:effectLst/>
+                <a:latin typeface="Avenir Book" panose="02000503020000020003" pitchFamily="2" charset="0"/>
+              </a:rPr>
+              <a:t>Namensnennung-Nicht kommerziell 4.0 International Lizenz.</a:t>
+            </a:r>
+          </a:p>
+          <a:p>
+            <a:pPr lvl="0" algn="ctr">
+              <a:defRPr sz="1800"/>
+            </a:pPr>
+            <a:r>
+              <a:rPr lang="de-DE" sz="800" dirty="0">
+                <a:solidFill>
+                  <a:schemeClr val="tx1">
+                    <a:lumMod val="65000"/>
+                    <a:lumOff val="35000"/>
+                  </a:schemeClr>
+                </a:solidFill>
+                <a:latin typeface="Avenir Book" panose="02000503020000020003" pitchFamily="2" charset="0"/>
                 <a:ea typeface="Calibri"/>
                 <a:cs typeface="Avenir Light"/>
                 <a:sym typeface="Calibri"/>
               </a:rPr>
-              <a:t>This work is licensed under the Creative Commons Attribution-NonCommercial-NoDerivatives 4.0 International License. </a:t>
-            </a:r>
-          </a:p>
-          <a:p>
-            <a:pPr lvl="0" algn="ctr">
-              <a:defRPr sz="1800"/>
-            </a:pPr>
-            <a:r>
-              <a:rPr sz="600" dirty="0">
-                <a:latin typeface="Avenir Light"/>
+              <a:t>Nachzulesen unter:</a:t>
+            </a:r>
+            <a:r>
+              <a:rPr sz="800" dirty="0">
+                <a:solidFill>
+                  <a:schemeClr val="tx1">
+                    <a:lumMod val="65000"/>
+                    <a:lumOff val="35000"/>
+                  </a:schemeClr>
+                </a:solidFill>
+                <a:latin typeface="Avenir Book" panose="02000503020000020003" pitchFamily="2" charset="0"/>
                 <a:ea typeface="Calibri"/>
                 <a:cs typeface="Avenir Light"/>
                 <a:sym typeface="Calibri"/>
               </a:rPr>
-              <a:t>To view a copy of this license, visit http://creativecommons.org/licenses/by-nc-nd/4.0/.</a:t>
-            </a:r>
+              <a:t> </a:t>
+            </a:r>
+            <a:r>
+              <a:rPr lang="de-DE" sz="800" dirty="0">
+                <a:solidFill>
+                  <a:schemeClr val="tx1">
+                    <a:lumMod val="65000"/>
+                    <a:lumOff val="35000"/>
+                  </a:schemeClr>
+                </a:solidFill>
+                <a:latin typeface="Avenir Book" panose="02000503020000020003" pitchFamily="2" charset="0"/>
+                <a:ea typeface="Calibri"/>
+                <a:cs typeface="Avenir Light"/>
+                <a:sym typeface="Calibri"/>
+              </a:rPr>
+              <a:t>https://</a:t>
+            </a:r>
+            <a:r>
+              <a:rPr lang="de-DE" sz="800" dirty="0" err="1">
+                <a:solidFill>
+                  <a:schemeClr val="tx1">
+                    <a:lumMod val="65000"/>
+                    <a:lumOff val="35000"/>
+                  </a:schemeClr>
+                </a:solidFill>
+                <a:latin typeface="Avenir Book" panose="02000503020000020003" pitchFamily="2" charset="0"/>
+                <a:ea typeface="Calibri"/>
+                <a:cs typeface="Avenir Light"/>
+                <a:sym typeface="Calibri"/>
+              </a:rPr>
+              <a:t>creativecommons.org</a:t>
+            </a:r>
+            <a:r>
+              <a:rPr lang="de-DE" sz="800" dirty="0">
+                <a:solidFill>
+                  <a:schemeClr val="tx1">
+                    <a:lumMod val="65000"/>
+                    <a:lumOff val="35000"/>
+                  </a:schemeClr>
+                </a:solidFill>
+                <a:latin typeface="Avenir Book" panose="02000503020000020003" pitchFamily="2" charset="0"/>
+                <a:ea typeface="Calibri"/>
+                <a:cs typeface="Avenir Light"/>
+                <a:sym typeface="Calibri"/>
+              </a:rPr>
+              <a:t>/</a:t>
+            </a:r>
+            <a:r>
+              <a:rPr lang="de-DE" sz="800" dirty="0" err="1">
+                <a:solidFill>
+                  <a:schemeClr val="tx1">
+                    <a:lumMod val="65000"/>
+                    <a:lumOff val="35000"/>
+                  </a:schemeClr>
+                </a:solidFill>
+                <a:latin typeface="Avenir Book" panose="02000503020000020003" pitchFamily="2" charset="0"/>
+                <a:ea typeface="Calibri"/>
+                <a:cs typeface="Avenir Light"/>
+                <a:sym typeface="Calibri"/>
+              </a:rPr>
+              <a:t>licenses</a:t>
+            </a:r>
+            <a:r>
+              <a:rPr lang="de-DE" sz="800" dirty="0">
+                <a:solidFill>
+                  <a:schemeClr val="tx1">
+                    <a:lumMod val="65000"/>
+                    <a:lumOff val="35000"/>
+                  </a:schemeClr>
+                </a:solidFill>
+                <a:latin typeface="Avenir Book" panose="02000503020000020003" pitchFamily="2" charset="0"/>
+                <a:ea typeface="Calibri"/>
+                <a:cs typeface="Avenir Light"/>
+                <a:sym typeface="Calibri"/>
+              </a:rPr>
+              <a:t>/</a:t>
+            </a:r>
+            <a:r>
+              <a:rPr lang="de-DE" sz="800" dirty="0" err="1">
+                <a:solidFill>
+                  <a:schemeClr val="tx1">
+                    <a:lumMod val="65000"/>
+                    <a:lumOff val="35000"/>
+                  </a:schemeClr>
+                </a:solidFill>
+                <a:latin typeface="Avenir Book" panose="02000503020000020003" pitchFamily="2" charset="0"/>
+                <a:ea typeface="Calibri"/>
+                <a:cs typeface="Avenir Light"/>
+                <a:sym typeface="Calibri"/>
+              </a:rPr>
+              <a:t>by-nc</a:t>
+            </a:r>
+            <a:r>
+              <a:rPr lang="de-DE" sz="800" dirty="0">
+                <a:solidFill>
+                  <a:schemeClr val="tx1">
+                    <a:lumMod val="65000"/>
+                    <a:lumOff val="35000"/>
+                  </a:schemeClr>
+                </a:solidFill>
+                <a:latin typeface="Avenir Book" panose="02000503020000020003" pitchFamily="2" charset="0"/>
+                <a:ea typeface="Calibri"/>
+                <a:cs typeface="Avenir Light"/>
+                <a:sym typeface="Calibri"/>
+              </a:rPr>
+              <a:t>/4.0/</a:t>
+            </a:r>
+            <a:r>
+              <a:rPr lang="de-DE" sz="800" dirty="0" err="1">
+                <a:solidFill>
+                  <a:schemeClr val="tx1">
+                    <a:lumMod val="65000"/>
+                    <a:lumOff val="35000"/>
+                  </a:schemeClr>
+                </a:solidFill>
+                <a:latin typeface="Avenir Book" panose="02000503020000020003" pitchFamily="2" charset="0"/>
+                <a:ea typeface="Calibri"/>
+                <a:cs typeface="Avenir Light"/>
+                <a:sym typeface="Calibri"/>
+              </a:rPr>
+              <a:t>deed.de</a:t>
+            </a:r>
+            <a:endParaRPr sz="800" dirty="0">
+              <a:solidFill>
+                <a:schemeClr val="tx1">
+                  <a:lumMod val="65000"/>
+                  <a:lumOff val="35000"/>
+                </a:schemeClr>
+              </a:solidFill>
+              <a:latin typeface="Avenir Book" panose="02000503020000020003" pitchFamily="2" charset="0"/>
+              <a:ea typeface="Calibri"/>
+              <a:cs typeface="Avenir Light"/>
+              <a:sym typeface="Calibri"/>
+            </a:endParaRPr>
           </a:p>
         </p:txBody>
       </p:sp>
       <p:pic>
         <p:nvPicPr>
-          <p:cNvPr id="12" name="pasted-image.tif"/>
+          <p:cNvPr id="14" name="pasted-image.tif">
+            <a:extLst>
+              <a:ext uri="{FF2B5EF4-FFF2-40B4-BE49-F238E27FC236}">
+                <a16:creationId xmlns:a16="http://schemas.microsoft.com/office/drawing/2014/main" id="{F17D06AB-E78F-70A9-7665-41F002087066}"/>
+              </a:ext>
+            </a:extLst>
+          </p:cNvPr>
           <p:cNvPicPr/>
           <p:nvPr/>
         </p:nvPicPr>
-        <p:blipFill>
-          <a:blip r:embed="rId5">
-            <a:extLst/>
-          </a:blip>
-          <a:stretch>
-            <a:fillRect/>
-          </a:stretch>
+        <p:blipFill rotWithShape="1">
+          <a:blip r:embed="rId5"/>
+          <a:srcRect r="24777" b="-3233"/>
+          <a:stretch/>
         </p:blipFill>
         <p:spPr>
           <a:xfrm>
-            <a:off x="6174185" y="4992838"/>
-            <a:ext cx="886619" cy="214128"/>
+            <a:off x="5724347" y="4733926"/>
+            <a:ext cx="1009828" cy="333374"/>
           </a:xfrm>
           <a:prstGeom prst="rect">
             <a:avLst/>
@@ -4293,58 +4496,6 @@
           </a:ln>
         </p:spPr>
       </p:pic>
-      <p:sp>
-        <p:nvSpPr>
-          <p:cNvPr id="13" name="Textfeld 12"/>
-          <p:cNvSpPr txBox="1"/>
-          <p:nvPr/>
-        </p:nvSpPr>
-        <p:spPr>
-          <a:xfrm>
-            <a:off x="239285" y="4936890"/>
-            <a:ext cx="1044856" cy="276999"/>
-          </a:xfrm>
-          <a:prstGeom prst="rect">
-            <a:avLst/>
-          </a:prstGeom>
-          <a:noFill/>
-        </p:spPr>
-        <p:txBody>
-          <a:bodyPr wrap="square" rtlCol="0">
-            <a:spAutoFit/>
-          </a:bodyPr>
-          <a:lstStyle/>
-          <a:p>
-            <a:r>
-              <a:rPr lang="de-DE" sz="600" dirty="0">
-                <a:solidFill>
-                  <a:srgbClr val="5D5E5F"/>
-                </a:solidFill>
-                <a:latin typeface="Avenir Light"/>
-                <a:cs typeface="Avenir Light"/>
-              </a:rPr>
-              <a:t>Letzte Änderung: </a:t>
-            </a:r>
-            <a:fld id="{7A8C7DAC-E536-564C-B5B3-90E8FAB50562}" type="datetime1">
-              <a:rPr lang="de-DE" sz="600" smtClean="0">
-                <a:solidFill>
-                  <a:srgbClr val="5D5E5F"/>
-                </a:solidFill>
-                <a:latin typeface="Avenir Light"/>
-                <a:cs typeface="Avenir Light"/>
-              </a:rPr>
-              <a:t>28.09.18</a:t>
-            </a:fld>
-            <a:endParaRPr lang="de-DE" sz="600" dirty="0">
-              <a:solidFill>
-                <a:srgbClr val="5D5E5F"/>
-              </a:solidFill>
-              <a:latin typeface="Avenir Light"/>
-              <a:cs typeface="Avenir Light"/>
-            </a:endParaRPr>
-          </a:p>
-        </p:txBody>
-      </p:sp>
     </p:spTree>
     <p:extLst>
       <p:ext uri="{BB962C8B-B14F-4D97-AF65-F5344CB8AC3E}">

</xml_diff>

<commit_message>
SCR 01 und 14 Blocksatz und Quellen
</commit_message>
<xml_diff>
--- a/training-cards/music moves/Scrum (SCR)/ger/apprentice/ger_SCR_01_Dauerlauf_mit_Sprints_MM_A.pptx
+++ b/training-cards/music moves/Scrum (SCR)/ger/apprentice/ger_SCR_01_Dauerlauf_mit_Sprints_MM_A.pptx
@@ -303,7 +303,7 @@
           <a:p>
             <a:fld id="{2771F302-5F8D-7040-824F-9A5E9428D1CE}" type="datetimeFigureOut">
               <a:rPr lang="de-DE" smtClean="0"/>
-              <a:t>23.07.23</a:t>
+              <a:t>01.08.24</a:t>
             </a:fld>
             <a:endParaRPr lang="de-DE"/>
           </a:p>
@@ -471,7 +471,7 @@
           <a:p>
             <a:fld id="{2771F302-5F8D-7040-824F-9A5E9428D1CE}" type="datetimeFigureOut">
               <a:rPr lang="de-DE" smtClean="0"/>
-              <a:t>23.07.23</a:t>
+              <a:t>01.08.24</a:t>
             </a:fld>
             <a:endParaRPr lang="de-DE"/>
           </a:p>
@@ -649,7 +649,7 @@
           <a:p>
             <a:fld id="{2771F302-5F8D-7040-824F-9A5E9428D1CE}" type="datetimeFigureOut">
               <a:rPr lang="de-DE" smtClean="0"/>
-              <a:t>23.07.23</a:t>
+              <a:t>01.08.24</a:t>
             </a:fld>
             <a:endParaRPr lang="de-DE"/>
           </a:p>
@@ -817,7 +817,7 @@
           <a:p>
             <a:fld id="{2771F302-5F8D-7040-824F-9A5E9428D1CE}" type="datetimeFigureOut">
               <a:rPr lang="de-DE" smtClean="0"/>
-              <a:t>23.07.23</a:t>
+              <a:t>01.08.24</a:t>
             </a:fld>
             <a:endParaRPr lang="de-DE"/>
           </a:p>
@@ -1062,7 +1062,7 @@
           <a:p>
             <a:fld id="{2771F302-5F8D-7040-824F-9A5E9428D1CE}" type="datetimeFigureOut">
               <a:rPr lang="de-DE" smtClean="0"/>
-              <a:t>23.07.23</a:t>
+              <a:t>01.08.24</a:t>
             </a:fld>
             <a:endParaRPr lang="de-DE"/>
           </a:p>
@@ -1347,7 +1347,7 @@
           <a:p>
             <a:fld id="{2771F302-5F8D-7040-824F-9A5E9428D1CE}" type="datetimeFigureOut">
               <a:rPr lang="de-DE" smtClean="0"/>
-              <a:t>23.07.23</a:t>
+              <a:t>01.08.24</a:t>
             </a:fld>
             <a:endParaRPr lang="de-DE"/>
           </a:p>
@@ -1766,7 +1766,7 @@
           <a:p>
             <a:fld id="{2771F302-5F8D-7040-824F-9A5E9428D1CE}" type="datetimeFigureOut">
               <a:rPr lang="de-DE" smtClean="0"/>
-              <a:t>23.07.23</a:t>
+              <a:t>01.08.24</a:t>
             </a:fld>
             <a:endParaRPr lang="de-DE"/>
           </a:p>
@@ -1883,7 +1883,7 @@
           <a:p>
             <a:fld id="{2771F302-5F8D-7040-824F-9A5E9428D1CE}" type="datetimeFigureOut">
               <a:rPr lang="de-DE" smtClean="0"/>
-              <a:t>23.07.23</a:t>
+              <a:t>01.08.24</a:t>
             </a:fld>
             <a:endParaRPr lang="de-DE"/>
           </a:p>
@@ -1978,7 +1978,7 @@
           <a:p>
             <a:fld id="{2771F302-5F8D-7040-824F-9A5E9428D1CE}" type="datetimeFigureOut">
               <a:rPr lang="de-DE" smtClean="0"/>
-              <a:t>23.07.23</a:t>
+              <a:t>01.08.24</a:t>
             </a:fld>
             <a:endParaRPr lang="de-DE"/>
           </a:p>
@@ -2253,7 +2253,7 @@
           <a:p>
             <a:fld id="{2771F302-5F8D-7040-824F-9A5E9428D1CE}" type="datetimeFigureOut">
               <a:rPr lang="de-DE" smtClean="0"/>
-              <a:t>23.07.23</a:t>
+              <a:t>01.08.24</a:t>
             </a:fld>
             <a:endParaRPr lang="de-DE"/>
           </a:p>
@@ -2505,7 +2505,7 @@
           <a:p>
             <a:fld id="{2771F302-5F8D-7040-824F-9A5E9428D1CE}" type="datetimeFigureOut">
               <a:rPr lang="de-DE" smtClean="0"/>
-              <a:t>23.07.23</a:t>
+              <a:t>01.08.24</a:t>
             </a:fld>
             <a:endParaRPr lang="de-DE"/>
           </a:p>
@@ -2716,7 +2716,7 @@
           <a:p>
             <a:fld id="{2771F302-5F8D-7040-824F-9A5E9428D1CE}" type="datetimeFigureOut">
               <a:rPr lang="de-DE" smtClean="0"/>
-              <a:t>23.07.23</a:t>
+              <a:t>01.08.24</a:t>
             </a:fld>
             <a:endParaRPr lang="de-DE"/>
           </a:p>
@@ -3327,7 +3327,7 @@
         <p:spPr>
           <a:xfrm>
             <a:off x="865450" y="1584056"/>
-            <a:ext cx="5942053" cy="3924151"/>
+            <a:ext cx="6228829" cy="4385816"/>
           </a:xfrm>
           <a:prstGeom prst="rect">
             <a:avLst/>
@@ -3345,24 +3345,24 @@
           </a:bodyPr>
           <a:lstStyle/>
           <a:p>
-            <a:pPr marL="271463" lvl="0" indent="-271463">
+            <a:pPr marL="271463" lvl="0" indent="-271463" algn="just">
               <a:buSzPct val="170000"/>
               <a:buBlip>
                 <a:blip r:embed="rId3"/>
               </a:buBlip>
             </a:pPr>
             <a:r>
-              <a:rPr lang="de-DE" sz="1000" dirty="0">
+              <a:rPr lang="de-DE" sz="1200" dirty="0">
                 <a:solidFill>
                   <a:srgbClr val="747982"/>
                 </a:solidFill>
                 <a:latin typeface="Avenir Book"/>
                 <a:cs typeface="Avenir Book"/>
               </a:rPr>
-              <a:t>Ein Sprint ist eine Zeiteinheit </a:t>
-            </a:r>
-            <a:r>
-              <a:rPr lang="de-DE" sz="1000" dirty="0">
+              <a:t>Ein Sprint ist eine Zeiteinheit „</a:t>
+            </a:r>
+            <a:r>
+              <a:rPr lang="de-DE" sz="1200" dirty="0">
                 <a:solidFill>
                   <a:srgbClr val="616575"/>
                 </a:solidFill>
@@ -3372,18 +3372,228 @@
               <a:t>von</a:t>
             </a:r>
             <a:r>
-              <a:rPr lang="de-DE" sz="1000" dirty="0">
+              <a:rPr lang="de-DE" sz="1200" dirty="0">
                 <a:solidFill>
                   <a:srgbClr val="747982"/>
                 </a:solidFill>
                 <a:latin typeface="Avenir Book"/>
                 <a:cs typeface="Avenir Book"/>
               </a:rPr>
-              <a:t> einer bis zu vier Wochen. Zu Beginn eines Sprints wird seine Dauer festgelegt und dann nicht mehr verändert.</a:t>
-            </a:r>
-          </a:p>
-          <a:p>
-            <a:pPr lvl="0">
+              <a:t> einem Monat oder weniger“ (</a:t>
+            </a:r>
+            <a:r>
+              <a:rPr lang="de-DE" sz="1200" dirty="0" err="1">
+                <a:solidFill>
+                  <a:srgbClr val="747982"/>
+                </a:solidFill>
+                <a:latin typeface="Avenir Book"/>
+                <a:cs typeface="Avenir Book"/>
+              </a:rPr>
+              <a:t>Schwaber</a:t>
+            </a:r>
+            <a:r>
+              <a:rPr lang="de-DE" sz="1200" dirty="0">
+                <a:solidFill>
+                  <a:srgbClr val="747982"/>
+                </a:solidFill>
+                <a:latin typeface="Avenir Book"/>
+                <a:cs typeface="Avenir Book"/>
+              </a:rPr>
+              <a:t>/Sutherland 2020, S. 8).</a:t>
+            </a:r>
+          </a:p>
+          <a:p>
+            <a:pPr marL="271463" indent="-271463" algn="just">
+              <a:buSzPct val="170000"/>
+              <a:buBlip>
+                <a:blip r:embed="rId3"/>
+              </a:buBlip>
+            </a:pPr>
+            <a:r>
+              <a:rPr lang="de-DE" sz="1200" dirty="0">
+                <a:solidFill>
+                  <a:srgbClr val="747982"/>
+                </a:solidFill>
+                <a:latin typeface="Avenir Book"/>
+                <a:cs typeface="Avenir Book"/>
+              </a:rPr>
+              <a:t>Sprints lösen sich unmittelbar ab. Wenn ein Sprint beendet ist, beginnt sofort der nächste (vgl. ebd., S.8).</a:t>
+            </a:r>
+          </a:p>
+          <a:p>
+            <a:pPr marL="271463" indent="-271463" algn="just">
+              <a:buSzPct val="170000"/>
+              <a:buBlip>
+                <a:blip r:embed="rId3"/>
+              </a:buBlip>
+            </a:pPr>
+            <a:r>
+              <a:rPr lang="de-DE" sz="1200" dirty="0">
+                <a:solidFill>
+                  <a:srgbClr val="747982"/>
+                </a:solidFill>
+                <a:latin typeface="Avenir Book"/>
+                <a:cs typeface="Avenir Book"/>
+              </a:rPr>
+              <a:t>Du stellst Dir Aufgaben für Deinen Sprint, die am Ende zu einem Wert bzw. zu einem vorzeigbaren Ergebnis führen. Größere Aufgaben kannst du in kleinere Einheiten zerlegen. Diese Aufgaben dokumentierst Du vor Beginn des Sprints.</a:t>
+            </a:r>
+          </a:p>
+          <a:p>
+            <a:pPr marL="271463" lvl="0" indent="-271463" algn="just">
+              <a:buSzPct val="170000"/>
+              <a:buBlip>
+                <a:blip r:embed="rId3"/>
+              </a:buBlip>
+            </a:pPr>
+            <a:r>
+              <a:rPr lang="de-DE" sz="1200" dirty="0">
+                <a:solidFill>
+                  <a:srgbClr val="747982"/>
+                </a:solidFill>
+                <a:latin typeface="Avenir Book"/>
+                <a:cs typeface="Avenir Book"/>
+              </a:rPr>
+              <a:t>Innerhalb des Sprints finden weitere Ereignisse statt, um ihn z.B. zu planen oder zu reflektieren (vgl. </a:t>
+            </a:r>
+            <a:r>
+              <a:rPr lang="de-DE" sz="1200" dirty="0" err="1">
+                <a:solidFill>
+                  <a:srgbClr val="747982"/>
+                </a:solidFill>
+                <a:latin typeface="Avenir Book"/>
+                <a:cs typeface="Avenir Book"/>
+              </a:rPr>
+              <a:t>ebd</a:t>
+            </a:r>
+            <a:r>
+              <a:rPr lang="de-DE" sz="1200" dirty="0">
+                <a:solidFill>
+                  <a:srgbClr val="747982"/>
+                </a:solidFill>
+                <a:latin typeface="Avenir Book"/>
+                <a:cs typeface="Avenir Book"/>
+              </a:rPr>
+              <a:t>, S. 8). Zu allen Events im Sprint gibt es eigene Trainingskarten: Sprint </a:t>
+            </a:r>
+            <a:r>
+              <a:rPr lang="de-DE" sz="1200" dirty="0" err="1">
+                <a:solidFill>
+                  <a:srgbClr val="747982"/>
+                </a:solidFill>
+                <a:latin typeface="Avenir Book"/>
+                <a:cs typeface="Avenir Book"/>
+              </a:rPr>
+              <a:t>Planning</a:t>
+            </a:r>
+            <a:r>
+              <a:rPr lang="de-DE" sz="1200" dirty="0">
+                <a:solidFill>
+                  <a:srgbClr val="747982"/>
+                </a:solidFill>
+                <a:latin typeface="Avenir Book"/>
+                <a:cs typeface="Avenir Book"/>
+              </a:rPr>
+              <a:t> ▻SCR 05, Sprint Retrospektive ▻ SCR 06, Daily </a:t>
+            </a:r>
+            <a:r>
+              <a:rPr lang="de-DE" sz="1200" dirty="0" err="1">
+                <a:solidFill>
+                  <a:srgbClr val="747982"/>
+                </a:solidFill>
+                <a:latin typeface="Avenir Book"/>
+                <a:cs typeface="Avenir Book"/>
+              </a:rPr>
+              <a:t>Scrum</a:t>
+            </a:r>
+            <a:r>
+              <a:rPr lang="de-DE" sz="1200" dirty="0">
+                <a:solidFill>
+                  <a:srgbClr val="747982"/>
+                </a:solidFill>
+                <a:latin typeface="Avenir Book"/>
+                <a:cs typeface="Avenir Book"/>
+              </a:rPr>
+              <a:t> ▻ TOM 16, Sprint Review ▻ SCR 02.</a:t>
+            </a:r>
+          </a:p>
+          <a:p>
+            <a:pPr marL="271463" lvl="0" indent="-271463" algn="just">
+              <a:buSzPct val="170000"/>
+              <a:buBlip>
+                <a:blip r:embed="rId3"/>
+              </a:buBlip>
+            </a:pPr>
+            <a:r>
+              <a:rPr lang="de-DE" sz="1200" dirty="0">
+                <a:solidFill>
+                  <a:srgbClr val="747982"/>
+                </a:solidFill>
+                <a:latin typeface="Avenir Book"/>
+                <a:cs typeface="Avenir Book"/>
+              </a:rPr>
+              <a:t>Einen Sprint zu trainieren, macht nur Sinn im Zusammenhang mit den Ereignissen, die ihn umrahmen. Füge zu Beginn ein Sprint </a:t>
+            </a:r>
+            <a:r>
+              <a:rPr lang="de-DE" sz="1200" dirty="0" err="1">
+                <a:solidFill>
+                  <a:srgbClr val="747982"/>
+                </a:solidFill>
+                <a:latin typeface="Avenir Book"/>
+                <a:cs typeface="Avenir Book"/>
+              </a:rPr>
+              <a:t>Planning</a:t>
+            </a:r>
+            <a:r>
+              <a:rPr lang="de-DE" sz="1200" dirty="0">
+                <a:solidFill>
+                  <a:srgbClr val="747982"/>
+                </a:solidFill>
+                <a:latin typeface="Avenir Book"/>
+                <a:cs typeface="Avenir Book"/>
+              </a:rPr>
+              <a:t> hinzu und am Ende ein Sprint Review oder eine Sprint Retro.</a:t>
+            </a:r>
+          </a:p>
+          <a:p>
+            <a:pPr marL="271463" indent="-271463" algn="just">
+              <a:buSzPct val="170000"/>
+              <a:buBlip>
+                <a:blip r:embed="rId3"/>
+              </a:buBlip>
+            </a:pPr>
+            <a:r>
+              <a:rPr lang="de-DE" sz="1200" dirty="0">
+                <a:solidFill>
+                  <a:srgbClr val="747982"/>
+                </a:solidFill>
+                <a:latin typeface="Avenir Book"/>
+                <a:cs typeface="Avenir Book"/>
+              </a:rPr>
+              <a:t>Ein Sprint im Alltag einen Musik-Studierenden kann beispielsweise die Zeit zwischen zwei Unterrichtsstunden sein. Das Sprint Review, sowie Teile des Sprint </a:t>
+            </a:r>
+            <a:r>
+              <a:rPr lang="de-DE" sz="1200" dirty="0" err="1">
+                <a:solidFill>
+                  <a:srgbClr val="747982"/>
+                </a:solidFill>
+                <a:latin typeface="Avenir Book"/>
+                <a:cs typeface="Avenir Book"/>
+              </a:rPr>
+              <a:t>Plannings</a:t>
+            </a:r>
+            <a:r>
+              <a:rPr lang="de-DE" sz="1200" dirty="0">
+                <a:solidFill>
+                  <a:srgbClr val="747982"/>
+                </a:solidFill>
+                <a:latin typeface="Avenir Book"/>
+                <a:cs typeface="Avenir Book"/>
+              </a:rPr>
+              <a:t> können im Hauptfachunterricht stattfinden.</a:t>
+            </a:r>
+          </a:p>
+          <a:p>
+            <a:pPr lvl="0" algn="just">
               <a:buSzPct val="170000"/>
             </a:pPr>
             <a:endParaRPr lang="de-DE" sz="1000" dirty="0">
@@ -3395,29 +3605,177 @@
             </a:endParaRPr>
           </a:p>
           <a:p>
-            <a:pPr marL="271463" lvl="0" indent="-271463">
+            <a:pPr>
               <a:buSzPct val="170000"/>
-              <a:buBlip>
-                <a:blip r:embed="rId3"/>
-              </a:buBlip>
             </a:pPr>
             <a:r>
-              <a:rPr lang="de-DE" sz="1000" dirty="0">
-                <a:solidFill>
-                  <a:srgbClr val="747982"/>
-                </a:solidFill>
-                <a:latin typeface="Avenir Book"/>
-                <a:cs typeface="Avenir Book"/>
-              </a:rPr>
-              <a:t>Zum Sprint gehört eine vorherige schriftliche Planung und ein Retrotreffen mit Deinem Team. Dort wird besprochen wie der Sprint verlaufen ist, und was man im nächsten Sprint verbessern kann. Zu beiden Events gibt es eigene Trainingskarten, wenn Du Dich an der Stelle für eine Vertiefung interessierst: SCR 05 und SCR 06.</a:t>
-            </a:r>
-          </a:p>
-          <a:p>
-            <a:pPr marL="271463" lvl="0" indent="-271463">
+              <a:rPr lang="de-DE" sz="800" dirty="0">
+                <a:solidFill>
+                  <a:schemeClr val="tx1">
+                    <a:lumMod val="65000"/>
+                    <a:lumOff val="35000"/>
+                  </a:schemeClr>
+                </a:solidFill>
+              </a:rPr>
+              <a:t>Quelle: </a:t>
+            </a:r>
+            <a:r>
+              <a:rPr lang="de-DE" sz="800" b="1" dirty="0" err="1">
+                <a:solidFill>
+                  <a:schemeClr val="tx1">
+                    <a:lumMod val="65000"/>
+                    <a:lumOff val="35000"/>
+                  </a:schemeClr>
+                </a:solidFill>
+              </a:rPr>
+              <a:t>Schwaber</a:t>
+            </a:r>
+            <a:r>
+              <a:rPr lang="de-DE" sz="800" dirty="0">
+                <a:solidFill>
+                  <a:schemeClr val="tx1">
+                    <a:lumMod val="65000"/>
+                    <a:lumOff val="35000"/>
+                  </a:schemeClr>
+                </a:solidFill>
+              </a:rPr>
+              <a:t>, Ken/Sutherland, Jeff (2020): Der </a:t>
+            </a:r>
+            <a:r>
+              <a:rPr lang="de-DE" sz="800" dirty="0" err="1">
+                <a:solidFill>
+                  <a:schemeClr val="tx1">
+                    <a:lumMod val="65000"/>
+                    <a:lumOff val="35000"/>
+                  </a:schemeClr>
+                </a:solidFill>
+              </a:rPr>
+              <a:t>Scrum</a:t>
+            </a:r>
+            <a:r>
+              <a:rPr lang="de-DE" sz="800" dirty="0">
+                <a:solidFill>
+                  <a:schemeClr val="tx1">
+                    <a:lumMod val="65000"/>
+                    <a:lumOff val="35000"/>
+                  </a:schemeClr>
+                </a:solidFill>
+              </a:rPr>
+              <a:t> Guide. Der gültige Leitfaden für </a:t>
+            </a:r>
+            <a:r>
+              <a:rPr lang="de-DE" sz="800" dirty="0" err="1">
+                <a:solidFill>
+                  <a:schemeClr val="tx1">
+                    <a:lumMod val="65000"/>
+                    <a:lumOff val="35000"/>
+                  </a:schemeClr>
+                </a:solidFill>
+              </a:rPr>
+              <a:t>Scrum</a:t>
+            </a:r>
+            <a:r>
+              <a:rPr lang="de-DE" sz="800" dirty="0">
+                <a:solidFill>
+                  <a:schemeClr val="tx1">
+                    <a:lumMod val="65000"/>
+                    <a:lumOff val="35000"/>
+                  </a:schemeClr>
+                </a:solidFill>
+              </a:rPr>
+              <a:t>: Die Spielregeln.  http://</a:t>
+            </a:r>
+            <a:r>
+              <a:rPr lang="de-DE" sz="800" dirty="0" err="1">
+                <a:solidFill>
+                  <a:schemeClr val="tx1">
+                    <a:lumMod val="65000"/>
+                    <a:lumOff val="35000"/>
+                  </a:schemeClr>
+                </a:solidFill>
+              </a:rPr>
+              <a:t>scrumguides.org</a:t>
+            </a:r>
+            <a:r>
+              <a:rPr lang="de-DE" sz="800" dirty="0">
+                <a:solidFill>
+                  <a:schemeClr val="tx1">
+                    <a:lumMod val="65000"/>
+                    <a:lumOff val="35000"/>
+                  </a:schemeClr>
+                </a:solidFill>
+              </a:rPr>
+              <a:t>/</a:t>
+            </a:r>
+            <a:r>
+              <a:rPr lang="de-DE" sz="800" dirty="0" err="1">
+                <a:solidFill>
+                  <a:schemeClr val="tx1">
+                    <a:lumMod val="65000"/>
+                    <a:lumOff val="35000"/>
+                  </a:schemeClr>
+                </a:solidFill>
+              </a:rPr>
+              <a:t>docs</a:t>
+            </a:r>
+            <a:r>
+              <a:rPr lang="de-DE" sz="800" dirty="0">
+                <a:solidFill>
+                  <a:schemeClr val="tx1">
+                    <a:lumMod val="65000"/>
+                    <a:lumOff val="35000"/>
+                  </a:schemeClr>
+                </a:solidFill>
+              </a:rPr>
+              <a:t>/   </a:t>
+            </a:r>
+            <a:br>
+              <a:rPr lang="de-DE" sz="800" dirty="0">
+                <a:solidFill>
+                  <a:schemeClr val="tx1">
+                    <a:lumMod val="65000"/>
+                    <a:lumOff val="35000"/>
+                  </a:schemeClr>
+                </a:solidFill>
+              </a:rPr>
+            </a:br>
+            <a:r>
+              <a:rPr lang="de-DE" sz="800" dirty="0">
+                <a:solidFill>
+                  <a:schemeClr val="tx1">
+                    <a:lumMod val="65000"/>
+                    <a:lumOff val="35000"/>
+                  </a:schemeClr>
+                </a:solidFill>
+              </a:rPr>
+              <a:t>                  </a:t>
+            </a:r>
+            <a:r>
+              <a:rPr lang="de-DE" sz="800" dirty="0" err="1">
+                <a:solidFill>
+                  <a:schemeClr val="tx1">
+                    <a:lumMod val="65000"/>
+                    <a:lumOff val="35000"/>
+                  </a:schemeClr>
+                </a:solidFill>
+              </a:rPr>
+              <a:t>scrumguide</a:t>
+            </a:r>
+            <a:r>
+              <a:rPr lang="de-DE" sz="800" dirty="0">
+                <a:solidFill>
+                  <a:schemeClr val="tx1">
+                    <a:lumMod val="65000"/>
+                    <a:lumOff val="35000"/>
+                  </a:schemeClr>
+                </a:solidFill>
+              </a:rPr>
+              <a:t>/v2020/2020-Scrum-Guide-German.pdf. Abgerufen am 25. Juli 2024</a:t>
+            </a:r>
+          </a:p>
+          <a:p>
+            <a:pPr lvl="0" algn="just">
               <a:buSzPct val="170000"/>
-              <a:buBlip>
-                <a:blip r:embed="rId3"/>
-              </a:buBlip>
             </a:pPr>
             <a:endParaRPr lang="de-DE" sz="1000" dirty="0">
               <a:solidFill>
@@ -3428,161 +3786,8 @@
             </a:endParaRPr>
           </a:p>
           <a:p>
-            <a:pPr marL="271463" lvl="0" indent="-271463">
+            <a:pPr lvl="0">
               <a:buSzPct val="170000"/>
-              <a:buBlip>
-                <a:blip r:embed="rId3"/>
-              </a:buBlip>
-            </a:pPr>
-            <a:r>
-              <a:rPr lang="de-DE" sz="1000" dirty="0">
-                <a:solidFill>
-                  <a:srgbClr val="747982"/>
-                </a:solidFill>
-                <a:latin typeface="Avenir Book"/>
-                <a:cs typeface="Avenir Book"/>
-              </a:rPr>
-              <a:t>Ein Sprint kann beispielsweise die Zeit zwischen zwei Unterrichtsstunden sein.</a:t>
-            </a:r>
-          </a:p>
-          <a:p>
-            <a:pPr marL="271463" lvl="0" indent="-271463">
-              <a:buSzPct val="170000"/>
-              <a:buBlip>
-                <a:blip r:embed="rId3"/>
-              </a:buBlip>
-            </a:pPr>
-            <a:endParaRPr lang="de-DE" sz="1000" dirty="0">
-              <a:solidFill>
-                <a:srgbClr val="747982"/>
-              </a:solidFill>
-              <a:latin typeface="Avenir Book"/>
-              <a:cs typeface="Avenir Book"/>
-            </a:endParaRPr>
-          </a:p>
-          <a:p>
-            <a:pPr marL="271463" lvl="0" indent="-271463">
-              <a:buSzPct val="170000"/>
-              <a:buBlip>
-                <a:blip r:embed="rId3"/>
-              </a:buBlip>
-            </a:pPr>
-            <a:r>
-              <a:rPr lang="de-DE" sz="1000" dirty="0">
-                <a:solidFill>
-                  <a:srgbClr val="747982"/>
-                </a:solidFill>
-                <a:latin typeface="Avenir Book"/>
-                <a:cs typeface="Avenir Book"/>
-              </a:rPr>
-              <a:t>Sprints lösen sich unmittelbar ab. Wenn ein Sprint beendet ist, beginnt sofort der nächste.</a:t>
-            </a:r>
-          </a:p>
-          <a:p>
-            <a:pPr marL="271463" lvl="0" indent="-271463">
-              <a:buSzPct val="170000"/>
-              <a:buBlip>
-                <a:blip r:embed="rId3"/>
-              </a:buBlip>
-            </a:pPr>
-            <a:endParaRPr lang="de-DE" sz="1000" dirty="0">
-              <a:solidFill>
-                <a:srgbClr val="747982"/>
-              </a:solidFill>
-              <a:latin typeface="Avenir Book"/>
-              <a:cs typeface="Avenir Book"/>
-            </a:endParaRPr>
-          </a:p>
-          <a:p>
-            <a:pPr marL="271463" lvl="0" indent="-271463">
-              <a:buSzPct val="170000"/>
-              <a:buBlip>
-                <a:blip r:embed="rId3"/>
-              </a:buBlip>
-            </a:pPr>
-            <a:r>
-              <a:rPr lang="de-DE" sz="1000" dirty="0">
-                <a:solidFill>
-                  <a:srgbClr val="747982"/>
-                </a:solidFill>
-                <a:latin typeface="Avenir Book"/>
-                <a:cs typeface="Avenir Book"/>
-              </a:rPr>
-              <a:t>Ein Sprint wird nicht unterbrochen, nachdem er gestartet wurde.</a:t>
-            </a:r>
-          </a:p>
-          <a:p>
-            <a:pPr marL="271463" lvl="0" indent="-271463">
-              <a:buSzPct val="170000"/>
-              <a:buBlip>
-                <a:blip r:embed="rId3"/>
-              </a:buBlip>
-            </a:pPr>
-            <a:endParaRPr lang="de-DE" sz="1000" dirty="0">
-              <a:solidFill>
-                <a:srgbClr val="747982"/>
-              </a:solidFill>
-              <a:latin typeface="Avenir Book"/>
-              <a:cs typeface="Avenir Book"/>
-            </a:endParaRPr>
-          </a:p>
-          <a:p>
-            <a:pPr marL="271463" lvl="0" indent="-271463">
-              <a:buSzPct val="170000"/>
-              <a:buBlip>
-                <a:blip r:embed="rId3"/>
-              </a:buBlip>
-            </a:pPr>
-            <a:r>
-              <a:rPr lang="de-DE" sz="1000" dirty="0">
-                <a:solidFill>
-                  <a:srgbClr val="747982"/>
-                </a:solidFill>
-                <a:latin typeface="Avenir Book"/>
-                <a:cs typeface="Avenir Book"/>
-              </a:rPr>
-              <a:t>Du stellst Dir Aufgaben für Deinen Sprint, die am Ende zu einem vorzeigbaren Ergebnis führen. Größere Aufgaben kannst du in kleinere Einheiten zerlegen. Diese Aufgaben dokumentierst Du vor Beginn des Sprints.</a:t>
-            </a:r>
-          </a:p>
-          <a:p>
-            <a:pPr marL="271463" lvl="0" indent="-271463">
-              <a:buSzPct val="170000"/>
-              <a:buBlip>
-                <a:blip r:embed="rId3"/>
-              </a:buBlip>
-            </a:pPr>
-            <a:endParaRPr lang="de-DE" sz="1000" dirty="0">
-              <a:solidFill>
-                <a:srgbClr val="747982"/>
-              </a:solidFill>
-              <a:latin typeface="Avenir Book"/>
-              <a:cs typeface="Avenir Book"/>
-            </a:endParaRPr>
-          </a:p>
-          <a:p>
-            <a:pPr marL="271463" lvl="0" indent="-271463">
-              <a:buSzPct val="170000"/>
-              <a:buBlip>
-                <a:blip r:embed="rId3"/>
-              </a:buBlip>
-            </a:pPr>
-            <a:r>
-              <a:rPr lang="de-DE" sz="1000" dirty="0">
-                <a:solidFill>
-                  <a:srgbClr val="747982"/>
-                </a:solidFill>
-                <a:latin typeface="Avenir Book"/>
-                <a:cs typeface="Avenir Book"/>
-              </a:rPr>
-              <a:t>Es kommen während dem Sprint keine neuen Aufgaben hinzu und keine weg. Es geht darum eine Wahrnehmung zu erarbeiten, wieviel Du in einem Sprint schaffen kannst und was für Dich sinnvolle vorzeigbare Ziele sind.</a:t>
-            </a:r>
-          </a:p>
-          <a:p>
-            <a:pPr marL="271463" lvl="0" indent="-271463">
-              <a:buSzPct val="170000"/>
-              <a:buBlip>
-                <a:blip r:embed="rId3"/>
-              </a:buBlip>
             </a:pPr>
             <a:endParaRPr lang="de-DE" sz="1000" dirty="0">
               <a:solidFill>
@@ -3992,7 +4197,7 @@
         <p:spPr>
           <a:xfrm>
             <a:off x="865450" y="1584056"/>
-            <a:ext cx="5942053" cy="2323713"/>
+            <a:ext cx="5942053" cy="3293209"/>
           </a:xfrm>
           <a:prstGeom prst="rect">
             <a:avLst/>
@@ -4010,6 +4215,84 @@
           </a:bodyPr>
           <a:lstStyle/>
           <a:p>
+            <a:pPr marL="271463" indent="-271463" algn="just">
+              <a:lnSpc>
+                <a:spcPct val="150000"/>
+              </a:lnSpc>
+              <a:buSzPct val="170000"/>
+              <a:buBlip>
+                <a:blip r:embed="rId3"/>
+              </a:buBlip>
+            </a:pPr>
+            <a:r>
+              <a:rPr lang="de-DE" sz="1200" dirty="0">
+                <a:solidFill>
+                  <a:srgbClr val="747982"/>
+                </a:solidFill>
+                <a:latin typeface="Avenir Book"/>
+                <a:cs typeface="Avenir Book"/>
+              </a:rPr>
+              <a:t>Plane zwei Sprints von je einer Woche. </a:t>
+            </a:r>
+          </a:p>
+          <a:p>
+            <a:pPr marL="271463" indent="-271463" algn="just">
+              <a:lnSpc>
+                <a:spcPct val="150000"/>
+              </a:lnSpc>
+              <a:buSzPct val="170000"/>
+              <a:buBlip>
+                <a:blip r:embed="rId3"/>
+              </a:buBlip>
+            </a:pPr>
+            <a:endParaRPr lang="de-DE" sz="1200" dirty="0">
+              <a:solidFill>
+                <a:srgbClr val="747982"/>
+              </a:solidFill>
+              <a:latin typeface="Avenir Book"/>
+              <a:cs typeface="Avenir Book"/>
+            </a:endParaRPr>
+          </a:p>
+          <a:p>
+            <a:pPr marL="271463" indent="-271463" algn="just">
+              <a:lnSpc>
+                <a:spcPct val="150000"/>
+              </a:lnSpc>
+              <a:buSzPct val="170000"/>
+              <a:buBlip>
+                <a:blip r:embed="rId3"/>
+              </a:buBlip>
+            </a:pPr>
+            <a:r>
+              <a:rPr lang="de-DE" sz="1200" dirty="0">
+                <a:solidFill>
+                  <a:srgbClr val="747982"/>
+                </a:solidFill>
+                <a:latin typeface="Avenir Book"/>
+                <a:cs typeface="Avenir Book"/>
+              </a:rPr>
+              <a:t>Ein Sprint gilt als durchgeführt wenn es vor dem Sprint eine Planung gegeben hat und nach dem Sprint ein Treffen mit Deiner Lehrkraft oder Deinem Team.</a:t>
+            </a:r>
+          </a:p>
+          <a:p>
+            <a:pPr marL="271463" indent="-271463" algn="just">
+              <a:lnSpc>
+                <a:spcPct val="150000"/>
+              </a:lnSpc>
+              <a:buSzPct val="170000"/>
+              <a:buBlip>
+                <a:blip r:embed="rId3"/>
+              </a:buBlip>
+            </a:pPr>
+            <a:endParaRPr lang="de-DE" sz="1200" dirty="0">
+              <a:solidFill>
+                <a:srgbClr val="747982"/>
+              </a:solidFill>
+              <a:latin typeface="Avenir Book"/>
+              <a:cs typeface="Avenir Book"/>
+            </a:endParaRPr>
+          </a:p>
+          <a:p>
             <a:pPr marL="271463" indent="-271463">
               <a:lnSpc>
                 <a:spcPct val="150000"/>
@@ -4020,92 +4303,71 @@
               </a:buBlip>
             </a:pPr>
             <a:r>
-              <a:rPr lang="de-DE" sz="1000" dirty="0">
+              <a:rPr lang="de-DE" sz="1200" dirty="0">
                 <a:solidFill>
                   <a:srgbClr val="747982"/>
                 </a:solidFill>
                 <a:latin typeface="Avenir Book"/>
                 <a:cs typeface="Avenir Book"/>
               </a:rPr>
-              <a:t>Plane zwei Sprints von je einer Woche. </a:t>
-            </a:r>
-          </a:p>
-          <a:p>
-            <a:pPr marL="271463" indent="-271463">
-              <a:lnSpc>
-                <a:spcPct val="150000"/>
-              </a:lnSpc>
-              <a:buSzPct val="170000"/>
-              <a:buBlip>
-                <a:blip r:embed="rId3"/>
-              </a:buBlip>
-            </a:pPr>
-            <a:endParaRPr lang="de-DE" sz="1000" dirty="0">
-              <a:solidFill>
-                <a:srgbClr val="747982"/>
-              </a:solidFill>
-              <a:latin typeface="Avenir Book"/>
-              <a:cs typeface="Avenir Book"/>
-            </a:endParaRPr>
-          </a:p>
-          <a:p>
-            <a:pPr marL="271463" indent="-271463">
-              <a:lnSpc>
-                <a:spcPct val="150000"/>
-              </a:lnSpc>
-              <a:buSzPct val="170000"/>
-              <a:buBlip>
-                <a:blip r:embed="rId3"/>
-              </a:buBlip>
-            </a:pPr>
-            <a:r>
-              <a:rPr lang="de-DE" sz="1000" dirty="0">
+              <a:t>Es ist unabhängig davon, ob alle Aufgaben im Sprint erledigt wurden. Sie rutschen nicht automatisch in den nächsten Sprint. Ein Folgesprint wird wieder von vorne und ohne Altlasten geplant. Ein Sprint kann als </a:t>
+            </a:r>
+            <a:br>
+              <a:rPr lang="de-DE" sz="1200" dirty="0">
                 <a:solidFill>
                   <a:srgbClr val="747982"/>
                 </a:solidFill>
                 <a:latin typeface="Avenir Book"/>
                 <a:cs typeface="Avenir Book"/>
               </a:rPr>
-              <a:t>Ein Sprint gilt als durchgeführt wenn es vor dem Sprint eine Planung gegeben hat und nach dem Sprint ein Treffen mit Deiner Lehrkraft oder Deinem Team.</a:t>
-            </a:r>
-          </a:p>
-          <a:p>
-            <a:pPr marL="271463" indent="-271463">
-              <a:lnSpc>
-                <a:spcPct val="150000"/>
-              </a:lnSpc>
-              <a:buSzPct val="170000"/>
-              <a:buBlip>
-                <a:blip r:embed="rId3"/>
-              </a:buBlip>
-            </a:pPr>
-            <a:endParaRPr lang="de-DE" sz="1000" dirty="0">
-              <a:solidFill>
-                <a:srgbClr val="747982"/>
-              </a:solidFill>
-              <a:latin typeface="Avenir Book"/>
-              <a:cs typeface="Avenir Book"/>
-            </a:endParaRPr>
-          </a:p>
-          <a:p>
-            <a:pPr marL="271463" indent="-271463">
-              <a:lnSpc>
-                <a:spcPct val="150000"/>
-              </a:lnSpc>
-              <a:buSzPct val="170000"/>
-              <a:buBlip>
-                <a:blip r:embed="rId3"/>
-              </a:buBlip>
-            </a:pPr>
-            <a:r>
-              <a:rPr lang="de-DE" sz="1000" dirty="0">
+            </a:br>
+            <a:r>
+              <a:rPr lang="de-DE" sz="1200" dirty="0">
                 <a:solidFill>
                   <a:srgbClr val="747982"/>
                 </a:solidFill>
                 <a:latin typeface="Avenir Book"/>
                 <a:cs typeface="Avenir Book"/>
               </a:rPr>
-              <a:t>Es ist unabhängig davon, ob alle Aufgaben im Sprint erledigt wurden. Sie rutschen nicht automatisch in den nächsten Sprint. Ein Folgesprint wird wieder von vorne und ohne Altlasten geplant. Ein Sprint kann als abgeschlossen gelten, wenn noch Aufgaben übrig sind. Wichtig ist, dass das Ergebnis vorzeigbar ist.</a:t>
+              <a:t>abgeschlossen gelten, wenn noch Aufgaben übrig sind. Wichtig ist, </a:t>
+            </a:r>
+            <a:br>
+              <a:rPr lang="de-DE" sz="1200" dirty="0">
+                <a:solidFill>
+                  <a:srgbClr val="747982"/>
+                </a:solidFill>
+                <a:latin typeface="Avenir Book"/>
+                <a:cs typeface="Avenir Book"/>
+              </a:rPr>
+            </a:br>
+            <a:r>
+              <a:rPr lang="de-DE" sz="1200" dirty="0">
+                <a:solidFill>
+                  <a:srgbClr val="747982"/>
+                </a:solidFill>
+                <a:latin typeface="Avenir Book"/>
+                <a:cs typeface="Avenir Book"/>
+              </a:rPr>
+              <a:t>dass Du einen Wert geschaffen hast und das Ergebnis vorzeigen </a:t>
+            </a:r>
+            <a:br>
+              <a:rPr lang="de-DE" sz="1200" dirty="0">
+                <a:solidFill>
+                  <a:srgbClr val="747982"/>
+                </a:solidFill>
+                <a:latin typeface="Avenir Book"/>
+                <a:cs typeface="Avenir Book"/>
+              </a:rPr>
+            </a:br>
+            <a:r>
+              <a:rPr lang="de-DE" sz="1200" dirty="0">
+                <a:solidFill>
+                  <a:srgbClr val="747982"/>
+                </a:solidFill>
+                <a:latin typeface="Avenir Book"/>
+                <a:cs typeface="Avenir Book"/>
+              </a:rPr>
+              <a:t>kannst.</a:t>
             </a:r>
           </a:p>
           <a:p>
@@ -4213,7 +4475,7 @@
           </a:ln>
           <a:extLst>
             <a:ext uri="{C572A759-6A51-4108-AA02-DFA0A04FC94B}">
-              <ma14:wrappingTextBoxFlag xmlns="" xmlns:ma14="http://schemas.microsoft.com/office/mac/drawingml/2011/main" val="1"/>
+              <ma14:wrappingTextBoxFlag xmlns:ma14="http://schemas.microsoft.com/office/mac/drawingml/2011/main" xmlns="" val="1"/>
             </a:ext>
           </a:extLst>
         </p:spPr>

</xml_diff>

<commit_message>
SCR 01 Layout angepasst
</commit_message>
<xml_diff>
--- a/training-cards/music moves/Scrum (SCR)/ger/apprentice/ger_SCR_01_Dauerlauf_mit_Sprints_MM_A.pptx
+++ b/training-cards/music moves/Scrum (SCR)/ger/apprentice/ger_SCR_01_Dauerlauf_mit_Sprints_MM_A.pptx
@@ -4,6 +4,9 @@
   <p:sldMasterIdLst>
     <p:sldMasterId id="2147483648" r:id="rId1"/>
   </p:sldMasterIdLst>
+  <p:notesMasterIdLst>
+    <p:notesMasterId r:id="rId4"/>
+  </p:notesMasterIdLst>
   <p:sldIdLst>
     <p:sldId id="256" r:id="rId2"/>
     <p:sldId id="257" r:id="rId3"/>
@@ -124,6 +127,355 @@
 </p:presentation>
 </file>
 
+<file path=ppt/notesMasters/notesMaster1.xml><?xml version="1.0" encoding="utf-8"?>
+<p:notesMaster xmlns:a="http://schemas.openxmlformats.org/drawingml/2006/main" xmlns:r="http://schemas.openxmlformats.org/officeDocument/2006/relationships" xmlns:p="http://schemas.openxmlformats.org/presentationml/2006/main">
+  <p:cSld>
+    <p:bg>
+      <p:bgRef idx="1001">
+        <a:schemeClr val="bg1"/>
+      </p:bgRef>
+    </p:bg>
+    <p:spTree>
+      <p:nvGrpSpPr>
+        <p:cNvPr id="1" name=""/>
+        <p:cNvGrpSpPr/>
+        <p:nvPr/>
+      </p:nvGrpSpPr>
+      <p:grpSpPr>
+        <a:xfrm>
+          <a:off x="0" y="0"/>
+          <a:ext cx="0" cy="0"/>
+          <a:chOff x="0" y="0"/>
+          <a:chExt cx="0" cy="0"/>
+        </a:xfrm>
+      </p:grpSpPr>
+      <p:sp>
+        <p:nvSpPr>
+          <p:cNvPr id="2" name="Kopfzeilenplatzhalter 1"/>
+          <p:cNvSpPr>
+            <a:spLocks noGrp="1"/>
+          </p:cNvSpPr>
+          <p:nvPr>
+            <p:ph type="hdr" sz="quarter"/>
+          </p:nvPr>
+        </p:nvSpPr>
+        <p:spPr>
+          <a:xfrm>
+            <a:off x="0" y="0"/>
+            <a:ext cx="2971800" cy="458788"/>
+          </a:xfrm>
+          <a:prstGeom prst="rect">
+            <a:avLst/>
+          </a:prstGeom>
+        </p:spPr>
+        <p:txBody>
+          <a:bodyPr vert="horz" lIns="91440" tIns="45720" rIns="91440" bIns="45720" rtlCol="0"/>
+          <a:lstStyle>
+            <a:lvl1pPr algn="l">
+              <a:defRPr sz="1200"/>
+            </a:lvl1pPr>
+          </a:lstStyle>
+          <a:p>
+            <a:endParaRPr lang="de-DE"/>
+          </a:p>
+        </p:txBody>
+      </p:sp>
+      <p:sp>
+        <p:nvSpPr>
+          <p:cNvPr id="3" name="Datumsplatzhalter 2"/>
+          <p:cNvSpPr>
+            <a:spLocks noGrp="1"/>
+          </p:cNvSpPr>
+          <p:nvPr>
+            <p:ph type="dt" idx="1"/>
+          </p:nvPr>
+        </p:nvSpPr>
+        <p:spPr>
+          <a:xfrm>
+            <a:off x="3884613" y="0"/>
+            <a:ext cx="2971800" cy="458788"/>
+          </a:xfrm>
+          <a:prstGeom prst="rect">
+            <a:avLst/>
+          </a:prstGeom>
+        </p:spPr>
+        <p:txBody>
+          <a:bodyPr vert="horz" lIns="91440" tIns="45720" rIns="91440" bIns="45720" rtlCol="0"/>
+          <a:lstStyle>
+            <a:lvl1pPr algn="r">
+              <a:defRPr sz="1200"/>
+            </a:lvl1pPr>
+          </a:lstStyle>
+          <a:p>
+            <a:fld id="{6BCDF3AF-5DAF-EC4B-A8D6-075A892741B1}" type="datetimeFigureOut">
+              <a:rPr lang="de-DE" smtClean="0"/>
+              <a:t>09.03.25</a:t>
+            </a:fld>
+            <a:endParaRPr lang="de-DE"/>
+          </a:p>
+        </p:txBody>
+      </p:sp>
+      <p:sp>
+        <p:nvSpPr>
+          <p:cNvPr id="4" name="Folienbildplatzhalter 3"/>
+          <p:cNvSpPr>
+            <a:spLocks noGrp="1" noRot="1" noChangeAspect="1"/>
+          </p:cNvSpPr>
+          <p:nvPr>
+            <p:ph type="sldImg" idx="2"/>
+          </p:nvPr>
+        </p:nvSpPr>
+        <p:spPr>
+          <a:xfrm>
+            <a:off x="1239838" y="1143000"/>
+            <a:ext cx="4378325" cy="3086100"/>
+          </a:xfrm>
+          <a:prstGeom prst="rect">
+            <a:avLst/>
+          </a:prstGeom>
+          <a:noFill/>
+          <a:ln w="12700">
+            <a:solidFill>
+              <a:prstClr val="black"/>
+            </a:solidFill>
+          </a:ln>
+        </p:spPr>
+        <p:txBody>
+          <a:bodyPr vert="horz" lIns="91440" tIns="45720" rIns="91440" bIns="45720" rtlCol="0" anchor="ctr"/>
+          <a:lstStyle/>
+          <a:p>
+            <a:endParaRPr lang="de-DE"/>
+          </a:p>
+        </p:txBody>
+      </p:sp>
+      <p:sp>
+        <p:nvSpPr>
+          <p:cNvPr id="5" name="Notizenplatzhalter 4"/>
+          <p:cNvSpPr>
+            <a:spLocks noGrp="1"/>
+          </p:cNvSpPr>
+          <p:nvPr>
+            <p:ph type="body" sz="quarter" idx="3"/>
+          </p:nvPr>
+        </p:nvSpPr>
+        <p:spPr>
+          <a:xfrm>
+            <a:off x="685800" y="4400550"/>
+            <a:ext cx="5486400" cy="3600450"/>
+          </a:xfrm>
+          <a:prstGeom prst="rect">
+            <a:avLst/>
+          </a:prstGeom>
+        </p:spPr>
+        <p:txBody>
+          <a:bodyPr vert="horz" lIns="91440" tIns="45720" rIns="91440" bIns="45720" rtlCol="0"/>
+          <a:lstStyle/>
+          <a:p>
+            <a:pPr lvl="0"/>
+            <a:r>
+              <a:rPr lang="de-DE"/>
+              <a:t>Mastertextformat bearbeiten</a:t>
+            </a:r>
+          </a:p>
+          <a:p>
+            <a:pPr lvl="1"/>
+            <a:r>
+              <a:rPr lang="de-DE"/>
+              <a:t>Zweite Ebene</a:t>
+            </a:r>
+          </a:p>
+          <a:p>
+            <a:pPr lvl="2"/>
+            <a:r>
+              <a:rPr lang="de-DE"/>
+              <a:t>Dritte Ebene</a:t>
+            </a:r>
+          </a:p>
+          <a:p>
+            <a:pPr lvl="3"/>
+            <a:r>
+              <a:rPr lang="de-DE"/>
+              <a:t>Vierte Ebene</a:t>
+            </a:r>
+          </a:p>
+          <a:p>
+            <a:pPr lvl="4"/>
+            <a:r>
+              <a:rPr lang="de-DE"/>
+              <a:t>Fünfte Ebene</a:t>
+            </a:r>
+          </a:p>
+        </p:txBody>
+      </p:sp>
+      <p:sp>
+        <p:nvSpPr>
+          <p:cNvPr id="6" name="Fußzeilenplatzhalter 5"/>
+          <p:cNvSpPr>
+            <a:spLocks noGrp="1"/>
+          </p:cNvSpPr>
+          <p:nvPr>
+            <p:ph type="ftr" sz="quarter" idx="4"/>
+          </p:nvPr>
+        </p:nvSpPr>
+        <p:spPr>
+          <a:xfrm>
+            <a:off x="0" y="8685213"/>
+            <a:ext cx="2971800" cy="458787"/>
+          </a:xfrm>
+          <a:prstGeom prst="rect">
+            <a:avLst/>
+          </a:prstGeom>
+        </p:spPr>
+        <p:txBody>
+          <a:bodyPr vert="horz" lIns="91440" tIns="45720" rIns="91440" bIns="45720" rtlCol="0" anchor="b"/>
+          <a:lstStyle>
+            <a:lvl1pPr algn="l">
+              <a:defRPr sz="1200"/>
+            </a:lvl1pPr>
+          </a:lstStyle>
+          <a:p>
+            <a:endParaRPr lang="de-DE"/>
+          </a:p>
+        </p:txBody>
+      </p:sp>
+      <p:sp>
+        <p:nvSpPr>
+          <p:cNvPr id="7" name="Foliennummernplatzhalter 6"/>
+          <p:cNvSpPr>
+            <a:spLocks noGrp="1"/>
+          </p:cNvSpPr>
+          <p:nvPr>
+            <p:ph type="sldNum" sz="quarter" idx="5"/>
+          </p:nvPr>
+        </p:nvSpPr>
+        <p:spPr>
+          <a:xfrm>
+            <a:off x="3884613" y="8685213"/>
+            <a:ext cx="2971800" cy="458787"/>
+          </a:xfrm>
+          <a:prstGeom prst="rect">
+            <a:avLst/>
+          </a:prstGeom>
+        </p:spPr>
+        <p:txBody>
+          <a:bodyPr vert="horz" lIns="91440" tIns="45720" rIns="91440" bIns="45720" rtlCol="0" anchor="b"/>
+          <a:lstStyle>
+            <a:lvl1pPr algn="r">
+              <a:defRPr sz="1200"/>
+            </a:lvl1pPr>
+          </a:lstStyle>
+          <a:p>
+            <a:fld id="{C4E667F8-BA26-2346-A3B0-74D03280AC9A}" type="slidenum">
+              <a:rPr lang="de-DE" smtClean="0"/>
+              <a:t>‹Nr.›</a:t>
+            </a:fld>
+            <a:endParaRPr lang="de-DE"/>
+          </a:p>
+        </p:txBody>
+      </p:sp>
+    </p:spTree>
+    <p:extLst>
+      <p:ext uri="{BB962C8B-B14F-4D97-AF65-F5344CB8AC3E}">
+        <p14:creationId xmlns:p14="http://schemas.microsoft.com/office/powerpoint/2010/main" val="521990871"/>
+      </p:ext>
+    </p:extLst>
+  </p:cSld>
+  <p:clrMap bg1="lt1" tx1="dk1" bg2="lt2" tx2="dk2" accent1="accent1" accent2="accent2" accent3="accent3" accent4="accent4" accent5="accent5" accent6="accent6" hlink="hlink" folHlink="folHlink"/>
+  <p:notesStyle>
+    <a:lvl1pPr marL="0" algn="l" defTabSz="914400" rtl="0" eaLnBrk="1" latinLnBrk="0" hangingPunct="1">
+      <a:defRPr sz="1200" kern="1200">
+        <a:solidFill>
+          <a:schemeClr val="tx1"/>
+        </a:solidFill>
+        <a:latin typeface="+mn-lt"/>
+        <a:ea typeface="+mn-ea"/>
+        <a:cs typeface="+mn-cs"/>
+      </a:defRPr>
+    </a:lvl1pPr>
+    <a:lvl2pPr marL="457200" algn="l" defTabSz="914400" rtl="0" eaLnBrk="1" latinLnBrk="0" hangingPunct="1">
+      <a:defRPr sz="1200" kern="1200">
+        <a:solidFill>
+          <a:schemeClr val="tx1"/>
+        </a:solidFill>
+        <a:latin typeface="+mn-lt"/>
+        <a:ea typeface="+mn-ea"/>
+        <a:cs typeface="+mn-cs"/>
+      </a:defRPr>
+    </a:lvl2pPr>
+    <a:lvl3pPr marL="914400" algn="l" defTabSz="914400" rtl="0" eaLnBrk="1" latinLnBrk="0" hangingPunct="1">
+      <a:defRPr sz="1200" kern="1200">
+        <a:solidFill>
+          <a:schemeClr val="tx1"/>
+        </a:solidFill>
+        <a:latin typeface="+mn-lt"/>
+        <a:ea typeface="+mn-ea"/>
+        <a:cs typeface="+mn-cs"/>
+      </a:defRPr>
+    </a:lvl3pPr>
+    <a:lvl4pPr marL="1371600" algn="l" defTabSz="914400" rtl="0" eaLnBrk="1" latinLnBrk="0" hangingPunct="1">
+      <a:defRPr sz="1200" kern="1200">
+        <a:solidFill>
+          <a:schemeClr val="tx1"/>
+        </a:solidFill>
+        <a:latin typeface="+mn-lt"/>
+        <a:ea typeface="+mn-ea"/>
+        <a:cs typeface="+mn-cs"/>
+      </a:defRPr>
+    </a:lvl4pPr>
+    <a:lvl5pPr marL="1828800" algn="l" defTabSz="914400" rtl="0" eaLnBrk="1" latinLnBrk="0" hangingPunct="1">
+      <a:defRPr sz="1200" kern="1200">
+        <a:solidFill>
+          <a:schemeClr val="tx1"/>
+        </a:solidFill>
+        <a:latin typeface="+mn-lt"/>
+        <a:ea typeface="+mn-ea"/>
+        <a:cs typeface="+mn-cs"/>
+      </a:defRPr>
+    </a:lvl5pPr>
+    <a:lvl6pPr marL="2286000" algn="l" defTabSz="914400" rtl="0" eaLnBrk="1" latinLnBrk="0" hangingPunct="1">
+      <a:defRPr sz="1200" kern="1200">
+        <a:solidFill>
+          <a:schemeClr val="tx1"/>
+        </a:solidFill>
+        <a:latin typeface="+mn-lt"/>
+        <a:ea typeface="+mn-ea"/>
+        <a:cs typeface="+mn-cs"/>
+      </a:defRPr>
+    </a:lvl6pPr>
+    <a:lvl7pPr marL="2743200" algn="l" defTabSz="914400" rtl="0" eaLnBrk="1" latinLnBrk="0" hangingPunct="1">
+      <a:defRPr sz="1200" kern="1200">
+        <a:solidFill>
+          <a:schemeClr val="tx1"/>
+        </a:solidFill>
+        <a:latin typeface="+mn-lt"/>
+        <a:ea typeface="+mn-ea"/>
+        <a:cs typeface="+mn-cs"/>
+      </a:defRPr>
+    </a:lvl7pPr>
+    <a:lvl8pPr marL="3200400" algn="l" defTabSz="914400" rtl="0" eaLnBrk="1" latinLnBrk="0" hangingPunct="1">
+      <a:defRPr sz="1200" kern="1200">
+        <a:solidFill>
+          <a:schemeClr val="tx1"/>
+        </a:solidFill>
+        <a:latin typeface="+mn-lt"/>
+        <a:ea typeface="+mn-ea"/>
+        <a:cs typeface="+mn-cs"/>
+      </a:defRPr>
+    </a:lvl8pPr>
+    <a:lvl9pPr marL="3657600" algn="l" defTabSz="914400" rtl="0" eaLnBrk="1" latinLnBrk="0" hangingPunct="1">
+      <a:defRPr sz="1200" kern="1200">
+        <a:solidFill>
+          <a:schemeClr val="tx1"/>
+        </a:solidFill>
+        <a:latin typeface="+mn-lt"/>
+        <a:ea typeface="+mn-ea"/>
+        <a:cs typeface="+mn-cs"/>
+      </a:defRPr>
+    </a:lvl9pPr>
+  </p:notesStyle>
+</p:notesMaster>
+</file>
+
 <file path=ppt/slideLayouts/slideLayout1.xml><?xml version="1.0" encoding="utf-8"?>
 <p:sldLayout xmlns:a="http://schemas.openxmlformats.org/drawingml/2006/main" xmlns:r="http://schemas.openxmlformats.org/officeDocument/2006/relationships" xmlns:p="http://schemas.openxmlformats.org/presentationml/2006/main" type="title" preserve="1">
   <p:cSld name="Titelfolie">
@@ -303,7 +655,7 @@
           <a:p>
             <a:fld id="{2771F302-5F8D-7040-824F-9A5E9428D1CE}" type="datetimeFigureOut">
               <a:rPr lang="de-DE" smtClean="0"/>
-              <a:t>01.08.24</a:t>
+              <a:t>09.03.25</a:t>
             </a:fld>
             <a:endParaRPr lang="de-DE"/>
           </a:p>
@@ -471,7 +823,7 @@
           <a:p>
             <a:fld id="{2771F302-5F8D-7040-824F-9A5E9428D1CE}" type="datetimeFigureOut">
               <a:rPr lang="de-DE" smtClean="0"/>
-              <a:t>01.08.24</a:t>
+              <a:t>09.03.25</a:t>
             </a:fld>
             <a:endParaRPr lang="de-DE"/>
           </a:p>
@@ -649,7 +1001,7 @@
           <a:p>
             <a:fld id="{2771F302-5F8D-7040-824F-9A5E9428D1CE}" type="datetimeFigureOut">
               <a:rPr lang="de-DE" smtClean="0"/>
-              <a:t>01.08.24</a:t>
+              <a:t>09.03.25</a:t>
             </a:fld>
             <a:endParaRPr lang="de-DE"/>
           </a:p>
@@ -817,7 +1169,7 @@
           <a:p>
             <a:fld id="{2771F302-5F8D-7040-824F-9A5E9428D1CE}" type="datetimeFigureOut">
               <a:rPr lang="de-DE" smtClean="0"/>
-              <a:t>01.08.24</a:t>
+              <a:t>09.03.25</a:t>
             </a:fld>
             <a:endParaRPr lang="de-DE"/>
           </a:p>
@@ -1062,7 +1414,7 @@
           <a:p>
             <a:fld id="{2771F302-5F8D-7040-824F-9A5E9428D1CE}" type="datetimeFigureOut">
               <a:rPr lang="de-DE" smtClean="0"/>
-              <a:t>01.08.24</a:t>
+              <a:t>09.03.25</a:t>
             </a:fld>
             <a:endParaRPr lang="de-DE"/>
           </a:p>
@@ -1347,7 +1699,7 @@
           <a:p>
             <a:fld id="{2771F302-5F8D-7040-824F-9A5E9428D1CE}" type="datetimeFigureOut">
               <a:rPr lang="de-DE" smtClean="0"/>
-              <a:t>01.08.24</a:t>
+              <a:t>09.03.25</a:t>
             </a:fld>
             <a:endParaRPr lang="de-DE"/>
           </a:p>
@@ -1766,7 +2118,7 @@
           <a:p>
             <a:fld id="{2771F302-5F8D-7040-824F-9A5E9428D1CE}" type="datetimeFigureOut">
               <a:rPr lang="de-DE" smtClean="0"/>
-              <a:t>01.08.24</a:t>
+              <a:t>09.03.25</a:t>
             </a:fld>
             <a:endParaRPr lang="de-DE"/>
           </a:p>
@@ -1883,7 +2235,7 @@
           <a:p>
             <a:fld id="{2771F302-5F8D-7040-824F-9A5E9428D1CE}" type="datetimeFigureOut">
               <a:rPr lang="de-DE" smtClean="0"/>
-              <a:t>01.08.24</a:t>
+              <a:t>09.03.25</a:t>
             </a:fld>
             <a:endParaRPr lang="de-DE"/>
           </a:p>
@@ -1978,7 +2330,7 @@
           <a:p>
             <a:fld id="{2771F302-5F8D-7040-824F-9A5E9428D1CE}" type="datetimeFigureOut">
               <a:rPr lang="de-DE" smtClean="0"/>
-              <a:t>01.08.24</a:t>
+              <a:t>09.03.25</a:t>
             </a:fld>
             <a:endParaRPr lang="de-DE"/>
           </a:p>
@@ -2253,7 +2605,7 @@
           <a:p>
             <a:fld id="{2771F302-5F8D-7040-824F-9A5E9428D1CE}" type="datetimeFigureOut">
               <a:rPr lang="de-DE" smtClean="0"/>
-              <a:t>01.08.24</a:t>
+              <a:t>09.03.25</a:t>
             </a:fld>
             <a:endParaRPr lang="de-DE"/>
           </a:p>
@@ -2505,7 +2857,7 @@
           <a:p>
             <a:fld id="{2771F302-5F8D-7040-824F-9A5E9428D1CE}" type="datetimeFigureOut">
               <a:rPr lang="de-DE" smtClean="0"/>
-              <a:t>01.08.24</a:t>
+              <a:t>09.03.25</a:t>
             </a:fld>
             <a:endParaRPr lang="de-DE"/>
           </a:p>
@@ -2716,7 +3068,7 @@
           <a:p>
             <a:fld id="{2771F302-5F8D-7040-824F-9A5E9428D1CE}" type="datetimeFigureOut">
               <a:rPr lang="de-DE" smtClean="0"/>
-              <a:t>01.08.24</a:t>
+              <a:t>09.03.25</a:t>
             </a:fld>
             <a:endParaRPr lang="de-DE"/>
           </a:p>
@@ -4196,8 +4548,8 @@
         </p:nvSpPr>
         <p:spPr>
           <a:xfrm>
-            <a:off x="865450" y="1584056"/>
-            <a:ext cx="5942053" cy="3293209"/>
+            <a:off x="894326" y="1376862"/>
+            <a:ext cx="5942053" cy="2185214"/>
           </a:xfrm>
           <a:prstGeom prst="rect">
             <a:avLst/>
@@ -4293,7 +4645,7 @@
             </a:endParaRPr>
           </a:p>
           <a:p>
-            <a:pPr marL="271463" indent="-271463">
+            <a:pPr marL="271463" indent="-271463" algn="just">
               <a:lnSpc>
                 <a:spcPct val="150000"/>
               </a:lnSpc>
@@ -4310,64 +4662,7 @@
                 <a:latin typeface="Avenir Book"/>
                 <a:cs typeface="Avenir Book"/>
               </a:rPr>
-              <a:t>Es ist unabhängig davon, ob alle Aufgaben im Sprint erledigt wurden. Sie rutschen nicht automatisch in den nächsten Sprint. Ein Folgesprint wird wieder von vorne und ohne Altlasten geplant. Ein Sprint kann als </a:t>
-            </a:r>
-            <a:br>
-              <a:rPr lang="de-DE" sz="1200" dirty="0">
-                <a:solidFill>
-                  <a:srgbClr val="747982"/>
-                </a:solidFill>
-                <a:latin typeface="Avenir Book"/>
-                <a:cs typeface="Avenir Book"/>
-              </a:rPr>
-            </a:br>
-            <a:r>
-              <a:rPr lang="de-DE" sz="1200" dirty="0">
-                <a:solidFill>
-                  <a:srgbClr val="747982"/>
-                </a:solidFill>
-                <a:latin typeface="Avenir Book"/>
-                <a:cs typeface="Avenir Book"/>
-              </a:rPr>
-              <a:t>abgeschlossen gelten, wenn noch Aufgaben übrig sind. Wichtig ist, </a:t>
-            </a:r>
-            <a:br>
-              <a:rPr lang="de-DE" sz="1200" dirty="0">
-                <a:solidFill>
-                  <a:srgbClr val="747982"/>
-                </a:solidFill>
-                <a:latin typeface="Avenir Book"/>
-                <a:cs typeface="Avenir Book"/>
-              </a:rPr>
-            </a:br>
-            <a:r>
-              <a:rPr lang="de-DE" sz="1200" dirty="0">
-                <a:solidFill>
-                  <a:srgbClr val="747982"/>
-                </a:solidFill>
-                <a:latin typeface="Avenir Book"/>
-                <a:cs typeface="Avenir Book"/>
-              </a:rPr>
-              <a:t>dass Du einen Wert geschaffen hast und das Ergebnis vorzeigen </a:t>
-            </a:r>
-            <a:br>
-              <a:rPr lang="de-DE" sz="1200" dirty="0">
-                <a:solidFill>
-                  <a:srgbClr val="747982"/>
-                </a:solidFill>
-                <a:latin typeface="Avenir Book"/>
-                <a:cs typeface="Avenir Book"/>
-              </a:rPr>
-            </a:br>
-            <a:r>
-              <a:rPr lang="de-DE" sz="1200" dirty="0">
-                <a:solidFill>
-                  <a:srgbClr val="747982"/>
-                </a:solidFill>
-                <a:latin typeface="Avenir Book"/>
-                <a:cs typeface="Avenir Book"/>
-              </a:rPr>
-              <a:t>kannst.</a:t>
+              <a:t>Es ist unabhängig davon, ob alle Aufgaben im Sprint erledigt wurden. Sie rutschen nicht automatisch in den nächsten Sprint. Ein Folgesprint wird wieder </a:t>
             </a:r>
           </a:p>
           <a:p>
@@ -4375,6 +4670,36 @@
           </a:p>
         </p:txBody>
       </p:sp>
+      <p:pic>
+        <p:nvPicPr>
+          <p:cNvPr id="2" name="Bild 1" descr="mm_Icon_apprentice.pdf"/>
+          <p:cNvPicPr>
+            <a:picLocks noChangeAspect="1"/>
+          </p:cNvPicPr>
+          <p:nvPr/>
+        </p:nvPicPr>
+        <p:blipFill>
+          <a:blip r:embed="rId4">
+            <a:extLst>
+              <a:ext uri="{28A0092B-C50C-407E-A947-70E740481C1C}">
+                <a14:useLocalDpi xmlns:a14="http://schemas.microsoft.com/office/drawing/2010/main" val="0"/>
+              </a:ext>
+            </a:extLst>
+          </a:blip>
+          <a:stretch>
+            <a:fillRect/>
+          </a:stretch>
+        </p:blipFill>
+        <p:spPr>
+          <a:xfrm>
+            <a:off x="6024717" y="3637195"/>
+            <a:ext cx="977900" cy="977900"/>
+          </a:xfrm>
+          <a:prstGeom prst="rect">
+            <a:avLst/>
+          </a:prstGeom>
+        </p:spPr>
+      </p:pic>
       <p:sp>
         <p:nvSpPr>
           <p:cNvPr id="10" name="Rechteck 9"/>
@@ -4420,36 +4745,6 @@
           </a:p>
         </p:txBody>
       </p:sp>
-      <p:pic>
-        <p:nvPicPr>
-          <p:cNvPr id="2" name="Bild 1" descr="mm_Icon_apprentice.pdf"/>
-          <p:cNvPicPr>
-            <a:picLocks noChangeAspect="1"/>
-          </p:cNvPicPr>
-          <p:nvPr/>
-        </p:nvPicPr>
-        <p:blipFill>
-          <a:blip r:embed="rId4">
-            <a:extLst>
-              <a:ext uri="{28A0092B-C50C-407E-A947-70E740481C1C}">
-                <a14:useLocalDpi xmlns:a14="http://schemas.microsoft.com/office/drawing/2010/main" val="0"/>
-              </a:ext>
-            </a:extLst>
-          </a:blip>
-          <a:stretch>
-            <a:fillRect/>
-          </a:stretch>
-        </p:blipFill>
-        <p:spPr>
-          <a:xfrm>
-            <a:off x="5928464" y="3564302"/>
-            <a:ext cx="977900" cy="977900"/>
-          </a:xfrm>
-          <a:prstGeom prst="rect">
-            <a:avLst/>
-          </a:prstGeom>
-        </p:spPr>
-      </p:pic>
       <p:sp>
         <p:nvSpPr>
           <p:cNvPr id="3" name="Shape 7">
@@ -4758,6 +5053,127 @@
           </a:ln>
         </p:spPr>
       </p:pic>
+      <p:sp>
+        <p:nvSpPr>
+          <p:cNvPr id="13" name="Textfeld 12">
+            <a:extLst>
+              <a:ext uri="{FF2B5EF4-FFF2-40B4-BE49-F238E27FC236}">
+                <a16:creationId xmlns:a16="http://schemas.microsoft.com/office/drawing/2014/main" id="{C0BE9A54-16AC-B48F-0A1C-56EAC44749F4}"/>
+              </a:ext>
+            </a:extLst>
+          </p:cNvPr>
+          <p:cNvSpPr txBox="1"/>
+          <p:nvPr/>
+        </p:nvSpPr>
+        <p:spPr>
+          <a:xfrm>
+            <a:off x="1161852" y="3023466"/>
+            <a:ext cx="4862866" cy="1631216"/>
+          </a:xfrm>
+          <a:prstGeom prst="rect">
+            <a:avLst/>
+          </a:prstGeom>
+          <a:noFill/>
+          <a:ln>
+            <a:solidFill>
+              <a:srgbClr val="FFFFFF"/>
+            </a:solidFill>
+          </a:ln>
+        </p:spPr>
+        <p:txBody>
+          <a:bodyPr wrap="square" rtlCol="0">
+            <a:spAutoFit/>
+          </a:bodyPr>
+          <a:lstStyle/>
+          <a:p>
+            <a:pPr algn="just">
+              <a:lnSpc>
+                <a:spcPct val="150000"/>
+              </a:lnSpc>
+              <a:buSzPct val="170000"/>
+            </a:pPr>
+            <a:br>
+              <a:rPr lang="de-DE" sz="1200" dirty="0">
+                <a:solidFill>
+                  <a:srgbClr val="747982"/>
+                </a:solidFill>
+                <a:latin typeface="Avenir Book"/>
+                <a:cs typeface="Avenir Book"/>
+              </a:rPr>
+            </a:br>
+            <a:r>
+              <a:rPr lang="de-DE" sz="1200" dirty="0">
+                <a:solidFill>
+                  <a:srgbClr val="747982"/>
+                </a:solidFill>
+                <a:latin typeface="Avenir Book"/>
+                <a:cs typeface="Avenir Book"/>
+              </a:rPr>
+              <a:t>von vorne und ohne Altlasten geplant. Ein Sprint kann als </a:t>
+            </a:r>
+            <a:br>
+              <a:rPr lang="de-DE" sz="1200" dirty="0">
+                <a:solidFill>
+                  <a:srgbClr val="747982"/>
+                </a:solidFill>
+                <a:latin typeface="Avenir Book"/>
+                <a:cs typeface="Avenir Book"/>
+              </a:rPr>
+            </a:br>
+            <a:r>
+              <a:rPr lang="de-DE" sz="1200" dirty="0">
+                <a:solidFill>
+                  <a:srgbClr val="747982"/>
+                </a:solidFill>
+                <a:latin typeface="Avenir Book"/>
+                <a:cs typeface="Avenir Book"/>
+              </a:rPr>
+              <a:t>abgeschlossen gelten, wenn noch Aufgaben übrig sind. Wichtig ist, </a:t>
+            </a:r>
+            <a:br>
+              <a:rPr lang="de-DE" sz="1200" dirty="0">
+                <a:solidFill>
+                  <a:srgbClr val="747982"/>
+                </a:solidFill>
+                <a:latin typeface="Avenir Book"/>
+                <a:cs typeface="Avenir Book"/>
+              </a:rPr>
+            </a:br>
+            <a:r>
+              <a:rPr lang="de-DE" sz="1200" dirty="0">
+                <a:solidFill>
+                  <a:srgbClr val="747982"/>
+                </a:solidFill>
+                <a:latin typeface="Avenir Book"/>
+                <a:cs typeface="Avenir Book"/>
+              </a:rPr>
+              <a:t>dass Du einen Wert geschaffen hast und das Ergebnis vorzeigen </a:t>
+            </a:r>
+            <a:br>
+              <a:rPr lang="de-DE" sz="1200" dirty="0">
+                <a:solidFill>
+                  <a:srgbClr val="747982"/>
+                </a:solidFill>
+                <a:latin typeface="Avenir Book"/>
+                <a:cs typeface="Avenir Book"/>
+              </a:rPr>
+            </a:br>
+            <a:r>
+              <a:rPr lang="de-DE" sz="1200" dirty="0">
+                <a:solidFill>
+                  <a:srgbClr val="747982"/>
+                </a:solidFill>
+                <a:latin typeface="Avenir Book"/>
+                <a:cs typeface="Avenir Book"/>
+              </a:rPr>
+              <a:t>kannst.</a:t>
+            </a:r>
+          </a:p>
+          <a:p>
+            <a:endParaRPr lang="de-DE" sz="1000" dirty="0"/>
+          </a:p>
+        </p:txBody>
+      </p:sp>
     </p:spTree>
     <p:extLst>
       <p:ext uri="{BB962C8B-B14F-4D97-AF65-F5344CB8AC3E}">
@@ -5089,4 +5505,319 @@
   </a:objectDefaults>
   <a:extraClrSchemeLst/>
 </a:theme>
+</file>
+
+<file path=ppt/theme/theme2.xml><?xml version="1.0" encoding="utf-8"?>
+<a:theme xmlns:a="http://schemas.openxmlformats.org/drawingml/2006/main" name="Office">
+  <a:themeElements>
+    <a:clrScheme name="Office">
+      <a:dk1>
+        <a:sysClr val="windowText" lastClr="000000"/>
+      </a:dk1>
+      <a:lt1>
+        <a:sysClr val="window" lastClr="FFFFFF"/>
+      </a:lt1>
+      <a:dk2>
+        <a:srgbClr val="0E2841"/>
+      </a:dk2>
+      <a:lt2>
+        <a:srgbClr val="E8E8E8"/>
+      </a:lt2>
+      <a:accent1>
+        <a:srgbClr val="156082"/>
+      </a:accent1>
+      <a:accent2>
+        <a:srgbClr val="E97132"/>
+      </a:accent2>
+      <a:accent3>
+        <a:srgbClr val="196B24"/>
+      </a:accent3>
+      <a:accent4>
+        <a:srgbClr val="0F9ED5"/>
+      </a:accent4>
+      <a:accent5>
+        <a:srgbClr val="A02B93"/>
+      </a:accent5>
+      <a:accent6>
+        <a:srgbClr val="4EA72E"/>
+      </a:accent6>
+      <a:hlink>
+        <a:srgbClr val="467886"/>
+      </a:hlink>
+      <a:folHlink>
+        <a:srgbClr val="96607D"/>
+      </a:folHlink>
+    </a:clrScheme>
+    <a:fontScheme name="Office">
+      <a:majorFont>
+        <a:latin typeface="Aptos Display" panose="02110004020202020204"/>
+        <a:ea typeface=""/>
+        <a:cs typeface=""/>
+        <a:font script="Jpan" typeface="游ゴシック Light"/>
+        <a:font script="Hang" typeface="맑은 고딕"/>
+        <a:font script="Hans" typeface="等线 Light"/>
+        <a:font script="Hant" typeface="新細明體"/>
+        <a:font script="Arab" typeface="Times New Roman"/>
+        <a:font script="Hebr" typeface="Times New Roman"/>
+        <a:font script="Thai" typeface="Angsana New"/>
+        <a:font script="Ethi" typeface="Nyala"/>
+        <a:font script="Beng" typeface="Vrinda"/>
+        <a:font script="Gujr" typeface="Shruti"/>
+        <a:font script="Khmr" typeface="MoolBoran"/>
+        <a:font script="Knda" typeface="Tunga"/>
+        <a:font script="Guru" typeface="Raavi"/>
+        <a:font script="Cans" typeface="Euphemia"/>
+        <a:font script="Cher" typeface="Plantagenet Cherokee"/>
+        <a:font script="Yiii" typeface="Microsoft Yi Baiti"/>
+        <a:font script="Tibt" typeface="Microsoft Himalaya"/>
+        <a:font script="Thaa" typeface="MV Boli"/>
+        <a:font script="Deva" typeface="Mangal"/>
+        <a:font script="Telu" typeface="Gautami"/>
+        <a:font script="Taml" typeface="Latha"/>
+        <a:font script="Syrc" typeface="Estrangelo Edessa"/>
+        <a:font script="Orya" typeface="Kalinga"/>
+        <a:font script="Mlym" typeface="Kartika"/>
+        <a:font script="Laoo" typeface="DokChampa"/>
+        <a:font script="Sinh" typeface="Iskoola Pota"/>
+        <a:font script="Mong" typeface="Mongolian Baiti"/>
+        <a:font script="Viet" typeface="Times New Roman"/>
+        <a:font script="Uigh" typeface="Microsoft Uighur"/>
+        <a:font script="Geor" typeface="Sylfaen"/>
+        <a:font script="Armn" typeface="Arial"/>
+        <a:font script="Bugi" typeface="Leelawadee UI"/>
+        <a:font script="Bopo" typeface="Microsoft JhengHei"/>
+        <a:font script="Java" typeface="Javanese Text"/>
+        <a:font script="Lisu" typeface="Segoe UI"/>
+        <a:font script="Mymr" typeface="Myanmar Text"/>
+        <a:font script="Nkoo" typeface="Ebrima"/>
+        <a:font script="Olck" typeface="Nirmala UI"/>
+        <a:font script="Osma" typeface="Ebrima"/>
+        <a:font script="Phag" typeface="Phagspa"/>
+        <a:font script="Syrn" typeface="Estrangelo Edessa"/>
+        <a:font script="Syrj" typeface="Estrangelo Edessa"/>
+        <a:font script="Syre" typeface="Estrangelo Edessa"/>
+        <a:font script="Sora" typeface="Nirmala UI"/>
+        <a:font script="Tale" typeface="Microsoft Tai Le"/>
+        <a:font script="Talu" typeface="Microsoft New Tai Lue"/>
+        <a:font script="Tfng" typeface="Ebrima"/>
+      </a:majorFont>
+      <a:minorFont>
+        <a:latin typeface="Aptos" panose="02110004020202020204"/>
+        <a:ea typeface=""/>
+        <a:cs typeface=""/>
+        <a:font script="Jpan" typeface="游ゴシック"/>
+        <a:font script="Hang" typeface="맑은 고딕"/>
+        <a:font script="Hans" typeface="等线"/>
+        <a:font script="Hant" typeface="新細明體"/>
+        <a:font script="Arab" typeface="Arial"/>
+        <a:font script="Hebr" typeface="Arial"/>
+        <a:font script="Thai" typeface="Cordia New"/>
+        <a:font script="Ethi" typeface="Nyala"/>
+        <a:font script="Beng" typeface="Vrinda"/>
+        <a:font script="Gujr" typeface="Shruti"/>
+        <a:font script="Khmr" typeface="DaunPenh"/>
+        <a:font script="Knda" typeface="Tunga"/>
+        <a:font script="Guru" typeface="Raavi"/>
+        <a:font script="Cans" typeface="Euphemia"/>
+        <a:font script="Cher" typeface="Plantagenet Cherokee"/>
+        <a:font script="Yiii" typeface="Microsoft Yi Baiti"/>
+        <a:font script="Tibt" typeface="Microsoft Himalaya"/>
+        <a:font script="Thaa" typeface="MV Boli"/>
+        <a:font script="Deva" typeface="Mangal"/>
+        <a:font script="Telu" typeface="Gautami"/>
+        <a:font script="Taml" typeface="Latha"/>
+        <a:font script="Syrc" typeface="Estrangelo Edessa"/>
+        <a:font script="Orya" typeface="Kalinga"/>
+        <a:font script="Mlym" typeface="Kartika"/>
+        <a:font script="Laoo" typeface="DokChampa"/>
+        <a:font script="Sinh" typeface="Iskoola Pota"/>
+        <a:font script="Mong" typeface="Mongolian Baiti"/>
+        <a:font script="Viet" typeface="Arial"/>
+        <a:font script="Uigh" typeface="Microsoft Uighur"/>
+        <a:font script="Geor" typeface="Sylfaen"/>
+        <a:font script="Armn" typeface="Arial"/>
+        <a:font script="Bugi" typeface="Leelawadee UI"/>
+        <a:font script="Bopo" typeface="Microsoft JhengHei"/>
+        <a:font script="Java" typeface="Javanese Text"/>
+        <a:font script="Lisu" typeface="Segoe UI"/>
+        <a:font script="Mymr" typeface="Myanmar Text"/>
+        <a:font script="Nkoo" typeface="Ebrima"/>
+        <a:font script="Olck" typeface="Nirmala UI"/>
+        <a:font script="Osma" typeface="Ebrima"/>
+        <a:font script="Phag" typeface="Phagspa"/>
+        <a:font script="Syrn" typeface="Estrangelo Edessa"/>
+        <a:font script="Syrj" typeface="Estrangelo Edessa"/>
+        <a:font script="Syre" typeface="Estrangelo Edessa"/>
+        <a:font script="Sora" typeface="Nirmala UI"/>
+        <a:font script="Tale" typeface="Microsoft Tai Le"/>
+        <a:font script="Talu" typeface="Microsoft New Tai Lue"/>
+        <a:font script="Tfng" typeface="Ebrima"/>
+      </a:minorFont>
+    </a:fontScheme>
+    <a:fmtScheme name="Office">
+      <a:fillStyleLst>
+        <a:solidFill>
+          <a:schemeClr val="phClr"/>
+        </a:solidFill>
+        <a:gradFill rotWithShape="1">
+          <a:gsLst>
+            <a:gs pos="0">
+              <a:schemeClr val="phClr">
+                <a:lumMod val="110000"/>
+                <a:satMod val="105000"/>
+                <a:tint val="67000"/>
+              </a:schemeClr>
+            </a:gs>
+            <a:gs pos="50000">
+              <a:schemeClr val="phClr">
+                <a:lumMod val="105000"/>
+                <a:satMod val="103000"/>
+                <a:tint val="73000"/>
+              </a:schemeClr>
+            </a:gs>
+            <a:gs pos="100000">
+              <a:schemeClr val="phClr">
+                <a:lumMod val="105000"/>
+                <a:satMod val="109000"/>
+                <a:tint val="81000"/>
+              </a:schemeClr>
+            </a:gs>
+          </a:gsLst>
+          <a:lin ang="5400000" scaled="0"/>
+        </a:gradFill>
+        <a:gradFill rotWithShape="1">
+          <a:gsLst>
+            <a:gs pos="0">
+              <a:schemeClr val="phClr">
+                <a:satMod val="103000"/>
+                <a:lumMod val="102000"/>
+                <a:tint val="94000"/>
+              </a:schemeClr>
+            </a:gs>
+            <a:gs pos="50000">
+              <a:schemeClr val="phClr">
+                <a:satMod val="110000"/>
+                <a:lumMod val="100000"/>
+                <a:shade val="100000"/>
+              </a:schemeClr>
+            </a:gs>
+            <a:gs pos="100000">
+              <a:schemeClr val="phClr">
+                <a:lumMod val="99000"/>
+                <a:satMod val="120000"/>
+                <a:shade val="78000"/>
+              </a:schemeClr>
+            </a:gs>
+          </a:gsLst>
+          <a:lin ang="5400000" scaled="0"/>
+        </a:gradFill>
+      </a:fillStyleLst>
+      <a:lnStyleLst>
+        <a:ln w="12700" cap="flat" cmpd="sng" algn="ctr">
+          <a:solidFill>
+            <a:schemeClr val="phClr"/>
+          </a:solidFill>
+          <a:prstDash val="solid"/>
+          <a:miter lim="800000"/>
+        </a:ln>
+        <a:ln w="19050" cap="flat" cmpd="sng" algn="ctr">
+          <a:solidFill>
+            <a:schemeClr val="phClr"/>
+          </a:solidFill>
+          <a:prstDash val="solid"/>
+          <a:miter lim="800000"/>
+        </a:ln>
+        <a:ln w="25400" cap="flat" cmpd="sng" algn="ctr">
+          <a:solidFill>
+            <a:schemeClr val="phClr"/>
+          </a:solidFill>
+          <a:prstDash val="solid"/>
+          <a:miter lim="800000"/>
+        </a:ln>
+      </a:lnStyleLst>
+      <a:effectStyleLst>
+        <a:effectStyle>
+          <a:effectLst/>
+        </a:effectStyle>
+        <a:effectStyle>
+          <a:effectLst/>
+        </a:effectStyle>
+        <a:effectStyle>
+          <a:effectLst>
+            <a:outerShdw blurRad="57150" dist="19050" dir="5400000" algn="ctr" rotWithShape="0">
+              <a:srgbClr val="000000">
+                <a:alpha val="63000"/>
+              </a:srgbClr>
+            </a:outerShdw>
+          </a:effectLst>
+        </a:effectStyle>
+      </a:effectStyleLst>
+      <a:bgFillStyleLst>
+        <a:solidFill>
+          <a:schemeClr val="phClr"/>
+        </a:solidFill>
+        <a:solidFill>
+          <a:schemeClr val="phClr">
+            <a:tint val="95000"/>
+            <a:satMod val="170000"/>
+          </a:schemeClr>
+        </a:solidFill>
+        <a:gradFill rotWithShape="1">
+          <a:gsLst>
+            <a:gs pos="0">
+              <a:schemeClr val="phClr">
+                <a:tint val="93000"/>
+                <a:satMod val="150000"/>
+                <a:shade val="98000"/>
+                <a:lumMod val="102000"/>
+              </a:schemeClr>
+            </a:gs>
+            <a:gs pos="50000">
+              <a:schemeClr val="phClr">
+                <a:tint val="98000"/>
+                <a:satMod val="130000"/>
+                <a:shade val="90000"/>
+                <a:lumMod val="103000"/>
+              </a:schemeClr>
+            </a:gs>
+            <a:gs pos="100000">
+              <a:schemeClr val="phClr">
+                <a:shade val="63000"/>
+                <a:satMod val="120000"/>
+              </a:schemeClr>
+            </a:gs>
+          </a:gsLst>
+          <a:lin ang="5400000" scaled="0"/>
+        </a:gradFill>
+      </a:bgFillStyleLst>
+    </a:fmtScheme>
+  </a:themeElements>
+  <a:objectDefaults>
+    <a:lnDef>
+      <a:spPr/>
+      <a:bodyPr/>
+      <a:lstStyle/>
+      <a:style>
+        <a:lnRef idx="2">
+          <a:schemeClr val="accent1"/>
+        </a:lnRef>
+        <a:fillRef idx="0">
+          <a:schemeClr val="accent1"/>
+        </a:fillRef>
+        <a:effectRef idx="1">
+          <a:schemeClr val="accent1"/>
+        </a:effectRef>
+        <a:fontRef idx="minor">
+          <a:schemeClr val="tx1"/>
+        </a:fontRef>
+      </a:style>
+    </a:lnDef>
+  </a:objectDefaults>
+  <a:extraClrSchemeLst/>
+  <a:extLst>
+    <a:ext uri="{05A4C25C-085E-4340-85A3-A5531E510DB2}">
+      <thm15:themeFamily xmlns:thm15="http://schemas.microsoft.com/office/thememl/2012/main" name="Office Theme" id="{2E142A2C-CD16-42D6-873A-C26D2A0506FA}" vid="{1BDDFF52-6CD6-40A5-AB3C-68EB2F1E4D0A}"/>
+    </a:ext>
+  </a:extLst>
+</a:theme>
 </file>
</xml_diff>

<commit_message>
SCR 01 Grammatikfehler verbessert und Pfeile
</commit_message>
<xml_diff>
--- a/training-cards/music moves/Scrum (SCR)/ger/apprentice/ger_SCR_01_Dauerlauf_mit_Sprints_MM_A.pptx
+++ b/training-cards/music moves/Scrum (SCR)/ger/apprentice/ger_SCR_01_Dauerlauf_mit_Sprints_MM_A.pptx
@@ -209,7 +209,7 @@
           <a:p>
             <a:fld id="{6BCDF3AF-5DAF-EC4B-A8D6-075A892741B1}" type="datetimeFigureOut">
               <a:rPr lang="de-DE" smtClean="0"/>
-              <a:t>09.03.25</a:t>
+              <a:t>09.06.25</a:t>
             </a:fld>
             <a:endParaRPr lang="de-DE"/>
           </a:p>
@@ -655,7 +655,7 @@
           <a:p>
             <a:fld id="{2771F302-5F8D-7040-824F-9A5E9428D1CE}" type="datetimeFigureOut">
               <a:rPr lang="de-DE" smtClean="0"/>
-              <a:t>09.03.25</a:t>
+              <a:t>09.06.25</a:t>
             </a:fld>
             <a:endParaRPr lang="de-DE"/>
           </a:p>
@@ -823,7 +823,7 @@
           <a:p>
             <a:fld id="{2771F302-5F8D-7040-824F-9A5E9428D1CE}" type="datetimeFigureOut">
               <a:rPr lang="de-DE" smtClean="0"/>
-              <a:t>09.03.25</a:t>
+              <a:t>09.06.25</a:t>
             </a:fld>
             <a:endParaRPr lang="de-DE"/>
           </a:p>
@@ -1001,7 +1001,7 @@
           <a:p>
             <a:fld id="{2771F302-5F8D-7040-824F-9A5E9428D1CE}" type="datetimeFigureOut">
               <a:rPr lang="de-DE" smtClean="0"/>
-              <a:t>09.03.25</a:t>
+              <a:t>09.06.25</a:t>
             </a:fld>
             <a:endParaRPr lang="de-DE"/>
           </a:p>
@@ -1169,7 +1169,7 @@
           <a:p>
             <a:fld id="{2771F302-5F8D-7040-824F-9A5E9428D1CE}" type="datetimeFigureOut">
               <a:rPr lang="de-DE" smtClean="0"/>
-              <a:t>09.03.25</a:t>
+              <a:t>09.06.25</a:t>
             </a:fld>
             <a:endParaRPr lang="de-DE"/>
           </a:p>
@@ -1414,7 +1414,7 @@
           <a:p>
             <a:fld id="{2771F302-5F8D-7040-824F-9A5E9428D1CE}" type="datetimeFigureOut">
               <a:rPr lang="de-DE" smtClean="0"/>
-              <a:t>09.03.25</a:t>
+              <a:t>09.06.25</a:t>
             </a:fld>
             <a:endParaRPr lang="de-DE"/>
           </a:p>
@@ -1699,7 +1699,7 @@
           <a:p>
             <a:fld id="{2771F302-5F8D-7040-824F-9A5E9428D1CE}" type="datetimeFigureOut">
               <a:rPr lang="de-DE" smtClean="0"/>
-              <a:t>09.03.25</a:t>
+              <a:t>09.06.25</a:t>
             </a:fld>
             <a:endParaRPr lang="de-DE"/>
           </a:p>
@@ -2118,7 +2118,7 @@
           <a:p>
             <a:fld id="{2771F302-5F8D-7040-824F-9A5E9428D1CE}" type="datetimeFigureOut">
               <a:rPr lang="de-DE" smtClean="0"/>
-              <a:t>09.03.25</a:t>
+              <a:t>09.06.25</a:t>
             </a:fld>
             <a:endParaRPr lang="de-DE"/>
           </a:p>
@@ -2235,7 +2235,7 @@
           <a:p>
             <a:fld id="{2771F302-5F8D-7040-824F-9A5E9428D1CE}" type="datetimeFigureOut">
               <a:rPr lang="de-DE" smtClean="0"/>
-              <a:t>09.03.25</a:t>
+              <a:t>09.06.25</a:t>
             </a:fld>
             <a:endParaRPr lang="de-DE"/>
           </a:p>
@@ -2330,7 +2330,7 @@
           <a:p>
             <a:fld id="{2771F302-5F8D-7040-824F-9A5E9428D1CE}" type="datetimeFigureOut">
               <a:rPr lang="de-DE" smtClean="0"/>
-              <a:t>09.03.25</a:t>
+              <a:t>09.06.25</a:t>
             </a:fld>
             <a:endParaRPr lang="de-DE"/>
           </a:p>
@@ -2605,7 +2605,7 @@
           <a:p>
             <a:fld id="{2771F302-5F8D-7040-824F-9A5E9428D1CE}" type="datetimeFigureOut">
               <a:rPr lang="de-DE" smtClean="0"/>
-              <a:t>09.03.25</a:t>
+              <a:t>09.06.25</a:t>
             </a:fld>
             <a:endParaRPr lang="de-DE"/>
           </a:p>
@@ -2857,7 +2857,7 @@
           <a:p>
             <a:fld id="{2771F302-5F8D-7040-824F-9A5E9428D1CE}" type="datetimeFigureOut">
               <a:rPr lang="de-DE" smtClean="0"/>
-              <a:t>09.03.25</a:t>
+              <a:t>09.06.25</a:t>
             </a:fld>
             <a:endParaRPr lang="de-DE"/>
           </a:p>
@@ -3068,7 +3068,7 @@
           <a:p>
             <a:fld id="{2771F302-5F8D-7040-824F-9A5E9428D1CE}" type="datetimeFigureOut">
               <a:rPr lang="de-DE" smtClean="0"/>
-              <a:t>09.03.25</a:t>
+              <a:t>09.06.25</a:t>
             </a:fld>
             <a:endParaRPr lang="de-DE"/>
           </a:p>
@@ -3845,7 +3845,7 @@
                 <a:latin typeface="Avenir Book"/>
                 <a:cs typeface="Avenir Book"/>
               </a:rPr>
-              <a:t> ▻SCR 05, Sprint Retrospektive ▻ SCR 06, Daily </a:t>
+              <a:t> (→ SCR 05), Sprint Retrospektive (→ SCR 06), Daily </a:t>
             </a:r>
             <a:r>
               <a:rPr lang="de-DE" sz="1200" dirty="0" err="1">
@@ -3865,7 +3865,7 @@
                 <a:latin typeface="Avenir Book"/>
                 <a:cs typeface="Avenir Book"/>
               </a:rPr>
-              <a:t> ▻ TOM 16, Sprint Review ▻ SCR 02.</a:t>
+              <a:t> (→ TOM 16), Sprint Review (→ SCR 02).</a:t>
             </a:r>
           </a:p>
           <a:p>
@@ -3883,7 +3883,7 @@
                 <a:latin typeface="Avenir Book"/>
                 <a:cs typeface="Avenir Book"/>
               </a:rPr>
-              <a:t>Einen Sprint zu trainieren, macht nur Sinn im Zusammenhang mit den Ereignissen, die ihn umrahmen. Füge zu Beginn ein Sprint </a:t>
+              <a:t>Einen Sprint zu trainieren, ergibt nur Sinn im Zusammenhang mit den Ereignissen, die ihn umrahmen. Füge zu Beginn ein Sprint </a:t>
             </a:r>
             <a:r>
               <a:rPr lang="de-DE" sz="1200" dirty="0" err="1">
@@ -3921,7 +3921,7 @@
                 <a:latin typeface="Avenir Book"/>
                 <a:cs typeface="Avenir Book"/>
               </a:rPr>
-              <a:t>Ein Sprint im Alltag einen Musik-Studierenden kann beispielsweise die Zeit zwischen zwei Unterrichtsstunden sein. Das Sprint Review, sowie Teile des Sprint </a:t>
+              <a:t>Ein Sprint im Alltag eines Musikstudierenden kann beispielsweise die Zeit zwischen zwei Unterrichtsstunden sein. Das Sprint Review sowie Teile des Sprint </a:t>
             </a:r>
             <a:r>
               <a:rPr lang="de-DE" sz="1200" dirty="0" err="1">
@@ -4623,7 +4623,7 @@
                 <a:latin typeface="Avenir Book"/>
                 <a:cs typeface="Avenir Book"/>
               </a:rPr>
-              <a:t>Ein Sprint gilt als durchgeführt wenn es vor dem Sprint eine Planung gegeben hat und nach dem Sprint ein Treffen mit Deiner Lehrkraft oder Deinem Team.</a:t>
+              <a:t>Ein Sprint gilt als durchgeführt, wenn es vor dem Sprint eine Planung gegeben hat und nach dem Sprint ein Treffen mit Deiner Lehrkraft oder Deinem Team.</a:t>
             </a:r>
           </a:p>
           <a:p>
@@ -4770,7 +4770,7 @@
           </a:ln>
           <a:extLst>
             <a:ext uri="{C572A759-6A51-4108-AA02-DFA0A04FC94B}">
-              <ma14:wrappingTextBoxFlag xmlns:ma14="http://schemas.microsoft.com/office/mac/drawingml/2011/main" xmlns="" val="1"/>
+              <ma14:wrappingTextBoxFlag xmlns="" xmlns:ma14="http://schemas.microsoft.com/office/mac/drawingml/2011/main" val="1"/>
             </a:ext>
           </a:extLst>
         </p:spPr>

</xml_diff>